<commit_message>
BX thông tin về chương stk, bài 5,6,7,8
</commit_message>
<xml_diff>
--- a/Bai 5 BIM va Okapi BM25.pptx
+++ b/Bai 5 BIM va Okapi BM25.pptx
@@ -5,7 +5,7 @@
     <p:sldMasterId id="2147483652" r:id="rId1"/>
   </p:sldMasterIdLst>
   <p:notesMasterIdLst>
-    <p:notesMasterId r:id="rId38"/>
+    <p:notesMasterId r:id="rId39"/>
   </p:notesMasterIdLst>
   <p:sldIdLst>
     <p:sldId id="313" r:id="rId2"/>
@@ -43,7 +43,8 @@
     <p:sldId id="306" r:id="rId34"/>
     <p:sldId id="307" r:id="rId35"/>
     <p:sldId id="308" r:id="rId36"/>
-    <p:sldId id="418" r:id="rId37"/>
+    <p:sldId id="435" r:id="rId37"/>
+    <p:sldId id="418" r:id="rId38"/>
   </p:sldIdLst>
   <p:sldSz cx="9144000" cy="6858000" type="screen4x3"/>
   <p:notesSz cx="6858000" cy="9144000"/>
@@ -174,7 +175,7 @@
   </p:defaultTextStyle>
   <p:extLst>
     <p:ext uri="{EFAFB233-063F-42B5-8137-9DF3F51BA10A}">
-      <p15:sldGuideLst xmlns:p15="http://schemas.microsoft.com/office/powerpoint/2012/main" xmlns="">
+      <p15:sldGuideLst xmlns:p15="http://schemas.microsoft.com/office/powerpoint/2012/main">
         <p15:guide id="1" orient="horz" pos="2160">
           <p15:clr>
             <a:srgbClr val="A4A3A4"/>
@@ -898,6 +899,11 @@
         </p:txBody>
       </p:sp>
     </p:spTree>
+    <p:extLst>
+      <p:ext uri="{BB962C8B-B14F-4D97-AF65-F5344CB8AC3E}">
+        <p14:creationId xmlns:p14="http://schemas.microsoft.com/office/powerpoint/2010/main" val="4123956550"/>
+      </p:ext>
+    </p:extLst>
   </p:cSld>
   <p:clrMapOvr>
     <a:masterClrMapping/>
@@ -1008,6 +1014,11 @@
         </p:txBody>
       </p:sp>
     </p:spTree>
+    <p:extLst>
+      <p:ext uri="{BB962C8B-B14F-4D97-AF65-F5344CB8AC3E}">
+        <p14:creationId xmlns:p14="http://schemas.microsoft.com/office/powerpoint/2010/main" val="3566476940"/>
+      </p:ext>
+    </p:extLst>
   </p:cSld>
   <p:clrMapOvr>
     <a:masterClrMapping/>
@@ -6964,29 +6975,25 @@
         <p:spPr>
           <a:xfrm>
             <a:off x="1331640" y="3645024"/>
-            <a:ext cx="6400800" cy="1752600"/>
+            <a:ext cx="6984776" cy="1752600"/>
           </a:xfrm>
         </p:spPr>
         <p:txBody>
           <a:bodyPr/>
           <a:lstStyle/>
           <a:p>
-            <a:pPr eaLnBrk="1" hangingPunct="1"/>
+            <a:pPr algn="l" eaLnBrk="1" hangingPunct="1"/>
             <a:r>
               <a:rPr lang="en-US" sz="2800" dirty="0" err="1" smtClean="0"/>
               <a:t>Chương</a:t>
             </a:r>
             <a:r>
               <a:rPr lang="en-US" sz="2800" dirty="0" smtClean="0"/>
-              <a:t> 5. </a:t>
-            </a:r>
-            <a:r>
-              <a:rPr lang="en-US" sz="2800" dirty="0" err="1" smtClean="0"/>
-              <a:t>Mô</a:t>
+              <a:t> </a:t>
             </a:r>
             <a:r>
               <a:rPr lang="en-US" sz="2800" dirty="0" smtClean="0"/>
-              <a:t> </a:t>
+              <a:t>5.Mô </a:t>
             </a:r>
             <a:r>
               <a:rPr lang="en-US" sz="2800" dirty="0" err="1" smtClean="0"/>
@@ -7024,7 +7031,15 @@
               <a:rPr lang="en-US" sz="2800" dirty="0" err="1" smtClean="0"/>
               <a:t>lập</a:t>
             </a:r>
-            <a:endParaRPr lang="en-US" sz="2000" dirty="0" smtClean="0"/>
+            <a:endParaRPr lang="en-US" sz="2800" dirty="0" smtClean="0"/>
+          </a:p>
+          <a:p>
+            <a:pPr algn="l" eaLnBrk="1" hangingPunct="1"/>
+            <a:r>
+              <a:rPr lang="en-US" sz="2400" dirty="0" smtClean="0"/>
+              <a:t>IIR.Chap11.Probabilistic information retrieval</a:t>
+            </a:r>
+            <a:endParaRPr lang="en-US" sz="2400" dirty="0" smtClean="0"/>
           </a:p>
         </p:txBody>
       </p:sp>
@@ -7767,7 +7782,7 @@
           <a:graphicData uri="http://schemas.openxmlformats.org/presentationml/2006/ole">
             <mc:AlternateContent xmlns:mc="http://schemas.openxmlformats.org/markup-compatibility/2006">
               <mc:Choice xmlns:v="urn:schemas-microsoft-com:vml" Requires="v">
-                <p:oleObj spid="_x0000_s12773" name="Equation" r:id="rId3" imgW="1218960" imgH="203040" progId="Equation.3">
+                <p:oleObj spid="_x0000_s12805" name="Equation" r:id="rId3" imgW="1218960" imgH="203040" progId="Equation.3">
                   <p:embed/>
                 </p:oleObj>
               </mc:Choice>
@@ -7860,7 +7875,7 @@
           <a:graphicData uri="http://schemas.openxmlformats.org/presentationml/2006/ole">
             <mc:AlternateContent xmlns:mc="http://schemas.openxmlformats.org/markup-compatibility/2006">
               <mc:Choice xmlns:v="urn:schemas-microsoft-com:vml" Requires="v">
-                <p:oleObj spid="_x0000_s12774" name="Equation" r:id="rId5" imgW="1524000" imgH="419100" progId="Equation.3">
+                <p:oleObj spid="_x0000_s12806" name="Equation" r:id="rId5" imgW="1524000" imgH="419100" progId="Equation.3">
                   <p:embed/>
                 </p:oleObj>
               </mc:Choice>
@@ -8202,7 +8217,7 @@
           <a:graphicData uri="http://schemas.openxmlformats.org/presentationml/2006/ole">
             <mc:AlternateContent xmlns:mc="http://schemas.openxmlformats.org/markup-compatibility/2006">
               <mc:Choice xmlns:v="urn:schemas-microsoft-com:vml" Requires="v">
-                <p:oleObj spid="_x0000_s12775" name="Equation" r:id="rId7" imgW="1473200" imgH="203200" progId="Equation.3">
+                <p:oleObj spid="_x0000_s12807" name="Equation" r:id="rId7" imgW="1473200" imgH="203200" progId="Equation.3">
                   <p:embed/>
                 </p:oleObj>
               </mc:Choice>
@@ -8301,7 +8316,7 @@
           <a:graphicData uri="http://schemas.openxmlformats.org/presentationml/2006/ole">
             <mc:AlternateContent xmlns:mc="http://schemas.openxmlformats.org/markup-compatibility/2006">
               <mc:Choice xmlns:v="urn:schemas-microsoft-com:vml" Requires="v">
-                <p:oleObj spid="_x0000_s12776" name="Equation" r:id="rId9" imgW="1473200" imgH="203200" progId="Equation.3">
+                <p:oleObj spid="_x0000_s12808" name="Equation" r:id="rId9" imgW="1473200" imgH="203200" progId="Equation.3">
                   <p:embed/>
                 </p:oleObj>
               </mc:Choice>
@@ -8538,7 +8553,7 @@
             <a:graphicData uri="http://schemas.openxmlformats.org/presentationml/2006/ole">
               <mc:AlternateContent xmlns:mc="http://schemas.openxmlformats.org/markup-compatibility/2006">
                 <mc:Choice xmlns:v="urn:schemas-microsoft-com:vml" Requires="v">
-                  <p:oleObj spid="_x0000_s13587" name="Формула" r:id="rId3" imgW="1574800" imgH="241300" progId="Equation.3">
+                  <p:oleObj spid="_x0000_s13603" name="Формула" r:id="rId3" imgW="1574800" imgH="241300" progId="Equation.3">
                     <p:embed/>
                   </p:oleObj>
                 </mc:Choice>
@@ -8875,7 +8890,7 @@
           <a:graphicData uri="http://schemas.openxmlformats.org/presentationml/2006/ole">
             <mc:AlternateContent xmlns:mc="http://schemas.openxmlformats.org/markup-compatibility/2006">
               <mc:Choice xmlns:v="urn:schemas-microsoft-com:vml" Requires="v">
-                <p:oleObj spid="_x0000_s13588" name="Equation" r:id="rId5" imgW="2501900" imgH="558800" progId="Equation.3">
+                <p:oleObj spid="_x0000_s13604" name="Equation" r:id="rId5" imgW="2501900" imgH="558800" progId="Equation.3">
                   <p:embed/>
                 </p:oleObj>
               </mc:Choice>
@@ -9926,7 +9941,7 @@
           <a:graphicData uri="http://schemas.openxmlformats.org/presentationml/2006/ole">
             <mc:AlternateContent xmlns:mc="http://schemas.openxmlformats.org/markup-compatibility/2006">
               <mc:Choice xmlns:v="urn:schemas-microsoft-com:vml" Requires="v">
-                <p:oleObj spid="_x0000_s14462" name="Формула" r:id="rId3" imgW="1524000" imgH="431800" progId="Equation.3">
+                <p:oleObj spid="_x0000_s14470" name="Формула" r:id="rId3" imgW="1524000" imgH="431800" progId="Equation.3">
                   <p:embed/>
                 </p:oleObj>
               </mc:Choice>
@@ -11186,7 +11201,7 @@
           <a:graphicData uri="http://schemas.openxmlformats.org/presentationml/2006/ole">
             <mc:AlternateContent xmlns:mc="http://schemas.openxmlformats.org/markup-compatibility/2006">
               <mc:Choice xmlns:v="urn:schemas-microsoft-com:vml" Requires="v">
-                <p:oleObj spid="_x0000_s15484" name="Equation" r:id="rId3" imgW="914400" imgH="266400" progId="Equation.3">
+                <p:oleObj spid="_x0000_s15492" name="Equation" r:id="rId3" imgW="914400" imgH="266400" progId="Equation.3">
                   <p:embed/>
                 </p:oleObj>
               </mc:Choice>
@@ -11709,7 +11724,7 @@
           <a:graphicData uri="http://schemas.openxmlformats.org/presentationml/2006/ole">
             <mc:AlternateContent xmlns:mc="http://schemas.openxmlformats.org/markup-compatibility/2006">
               <mc:Choice xmlns:v="urn:schemas-microsoft-com:vml" Requires="v">
-                <p:oleObj spid="_x0000_s16508" name="Equation" r:id="rId3" imgW="3454200" imgH="812520" progId="Equation.3">
+                <p:oleObj spid="_x0000_s16516" name="Equation" r:id="rId3" imgW="3454200" imgH="812520" progId="Equation.3">
                   <p:embed/>
                 </p:oleObj>
               </mc:Choice>
@@ -12983,7 +12998,7 @@
           <a:graphicData uri="http://schemas.openxmlformats.org/presentationml/2006/ole">
             <mc:AlternateContent xmlns:mc="http://schemas.openxmlformats.org/markup-compatibility/2006">
               <mc:Choice xmlns:v="urn:schemas-microsoft-com:vml" Requires="v">
-                <p:oleObj spid="_x0000_s17778" name="Equation" r:id="rId3" imgW="2489040" imgH="444240" progId="Equation.3">
+                <p:oleObj spid="_x0000_s17802" name="Equation" r:id="rId3" imgW="2489040" imgH="444240" progId="Equation.3">
                   <p:embed/>
                 </p:oleObj>
               </mc:Choice>
@@ -13078,7 +13093,7 @@
           <a:graphicData uri="http://schemas.openxmlformats.org/presentationml/2006/ole">
             <mc:AlternateContent xmlns:mc="http://schemas.openxmlformats.org/markup-compatibility/2006">
               <mc:Choice xmlns:v="urn:schemas-microsoft-com:vml" Requires="v">
-                <p:oleObj spid="_x0000_s17779" name="Equation" r:id="rId5" imgW="2171520" imgH="444240" progId="Equation.3">
+                <p:oleObj spid="_x0000_s17803" name="Equation" r:id="rId5" imgW="2171520" imgH="444240" progId="Equation.3">
                   <p:embed/>
                 </p:oleObj>
               </mc:Choice>
@@ -13173,7 +13188,7 @@
           <a:graphicData uri="http://schemas.openxmlformats.org/presentationml/2006/ole">
             <mc:AlternateContent xmlns:mc="http://schemas.openxmlformats.org/markup-compatibility/2006">
               <mc:Choice xmlns:v="urn:schemas-microsoft-com:vml" Requires="v">
-                <p:oleObj spid="_x0000_s17780" name="Equation" r:id="rId7" imgW="3530520" imgH="419040" progId="Equation.3">
+                <p:oleObj spid="_x0000_s17804" name="Equation" r:id="rId7" imgW="3530520" imgH="419040" progId="Equation.3">
                   <p:embed/>
                 </p:oleObj>
               </mc:Choice>
@@ -13413,7 +13428,7 @@
             <a:graphicData uri="http://schemas.openxmlformats.org/presentationml/2006/ole">
               <mc:AlternateContent xmlns:mc="http://schemas.openxmlformats.org/markup-compatibility/2006">
                 <mc:Choice xmlns:v="urn:schemas-microsoft-com:vml" Requires="v">
-                  <p:oleObj spid="_x0000_s19042" name="Equation" r:id="rId3" imgW="2489040" imgH="444240" progId="Equation.3">
+                  <p:oleObj spid="_x0000_s19082" name="Equation" r:id="rId3" imgW="2489040" imgH="444240" progId="Equation.3">
                     <p:embed/>
                   </p:oleObj>
                 </mc:Choice>
@@ -13508,7 +13523,7 @@
             <a:graphicData uri="http://schemas.openxmlformats.org/presentationml/2006/ole">
               <mc:AlternateContent xmlns:mc="http://schemas.openxmlformats.org/markup-compatibility/2006">
                 <mc:Choice xmlns:v="urn:schemas-microsoft-com:vml" Requires="v">
-                  <p:oleObj spid="_x0000_s19043" name="Equation" r:id="rId5" imgW="4089240" imgH="469800" progId="Equation.3">
+                  <p:oleObj spid="_x0000_s19083" name="Equation" r:id="rId5" imgW="4089240" imgH="469800" progId="Equation.3">
                     <p:embed/>
                   </p:oleObj>
                 </mc:Choice>
@@ -13908,7 +13923,7 @@
           <a:graphicData uri="http://schemas.openxmlformats.org/presentationml/2006/ole">
             <mc:AlternateContent xmlns:mc="http://schemas.openxmlformats.org/markup-compatibility/2006">
               <mc:Choice xmlns:v="urn:schemas-microsoft-com:vml" Requires="v">
-                <p:oleObj spid="_x0000_s19044" name="Equation" r:id="rId7" imgW="1422360" imgH="228600" progId="Equation.3">
+                <p:oleObj spid="_x0000_s19084" name="Equation" r:id="rId7" imgW="1422360" imgH="228600" progId="Equation.3">
                   <p:embed/>
                 </p:oleObj>
               </mc:Choice>
@@ -14003,7 +14018,7 @@
           <a:graphicData uri="http://schemas.openxmlformats.org/presentationml/2006/ole">
             <mc:AlternateContent xmlns:mc="http://schemas.openxmlformats.org/markup-compatibility/2006">
               <mc:Choice xmlns:v="urn:schemas-microsoft-com:vml" Requires="v">
-                <p:oleObj spid="_x0000_s19045" name="Equation" r:id="rId9" imgW="1334520" imgH="200880" progId="Equation.3">
+                <p:oleObj spid="_x0000_s19085" name="Equation" r:id="rId9" imgW="1334520" imgH="200880" progId="Equation.3">
                   <p:embed/>
                 </p:oleObj>
               </mc:Choice>
@@ -14104,7 +14119,7 @@
           <a:graphicData uri="http://schemas.openxmlformats.org/presentationml/2006/ole">
             <mc:AlternateContent xmlns:mc="http://schemas.openxmlformats.org/markup-compatibility/2006">
               <mc:Choice xmlns:v="urn:schemas-microsoft-com:vml" Requires="v">
-                <p:oleObj spid="_x0000_s19046" name="Equation" r:id="rId11" imgW="2489040" imgH="558720" progId="Equation.3">
+                <p:oleObj spid="_x0000_s19086" name="Equation" r:id="rId11" imgW="2489040" imgH="558720" progId="Equation.3">
                   <p:embed/>
                 </p:oleObj>
               </mc:Choice>
@@ -14861,7 +14876,7 @@
           <a:graphicData uri="http://schemas.openxmlformats.org/presentationml/2006/ole">
             <mc:AlternateContent xmlns:mc="http://schemas.openxmlformats.org/markup-compatibility/2006">
               <mc:Choice xmlns:v="urn:schemas-microsoft-com:vml" Requires="v">
-                <p:oleObj spid="_x0000_s19944" name="Equation" r:id="rId3" imgW="1384200" imgH="228600" progId="Equation.3">
+                <p:oleObj spid="_x0000_s19976" name="Equation" r:id="rId3" imgW="1384200" imgH="228600" progId="Equation.3">
                   <p:embed/>
                 </p:oleObj>
               </mc:Choice>
@@ -14927,7 +14942,7 @@
           <a:graphicData uri="http://schemas.openxmlformats.org/presentationml/2006/ole">
             <mc:AlternateContent xmlns:mc="http://schemas.openxmlformats.org/markup-compatibility/2006">
               <mc:Choice xmlns:v="urn:schemas-microsoft-com:vml" Requires="v">
-                <p:oleObj spid="_x0000_s19945" name="Equation" r:id="rId5" imgW="1358640" imgH="228600" progId="Equation.3">
+                <p:oleObj spid="_x0000_s19977" name="Equation" r:id="rId5" imgW="1358640" imgH="228600" progId="Equation.3">
                   <p:embed/>
                 </p:oleObj>
               </mc:Choice>
@@ -14993,7 +15008,7 @@
           <a:graphicData uri="http://schemas.openxmlformats.org/presentationml/2006/ole">
             <mc:AlternateContent xmlns:mc="http://schemas.openxmlformats.org/markup-compatibility/2006">
               <mc:Choice xmlns:v="urn:schemas-microsoft-com:vml" Requires="v">
-                <p:oleObj spid="_x0000_s19946" name="Equation" r:id="rId7" imgW="1587240" imgH="228600" progId="Equation.3">
+                <p:oleObj spid="_x0000_s19978" name="Equation" r:id="rId7" imgW="1587240" imgH="228600" progId="Equation.3">
                   <p:embed/>
                 </p:oleObj>
               </mc:Choice>
@@ -15059,7 +15074,7 @@
           <a:graphicData uri="http://schemas.openxmlformats.org/presentationml/2006/ole">
             <mc:AlternateContent xmlns:mc="http://schemas.openxmlformats.org/markup-compatibility/2006">
               <mc:Choice xmlns:v="urn:schemas-microsoft-com:vml" Requires="v">
-                <p:oleObj spid="_x0000_s19947" name="Equation" r:id="rId9" imgW="1574640" imgH="228600" progId="Equation.3">
+                <p:oleObj spid="_x0000_s19979" name="Equation" r:id="rId9" imgW="1574640" imgH="228600" progId="Equation.3">
                   <p:embed/>
                 </p:oleObj>
               </mc:Choice>
@@ -17408,7 +17423,7 @@
           <a:graphicData uri="http://schemas.openxmlformats.org/presentationml/2006/ole">
             <mc:AlternateContent xmlns:mc="http://schemas.openxmlformats.org/markup-compatibility/2006">
               <mc:Choice xmlns:v="urn:schemas-microsoft-com:vml" Requires="v">
-                <p:oleObj spid="_x0000_s20858" name="Equation" r:id="rId3" imgW="3492360" imgH="571320" progId="Equation.3">
+                <p:oleObj spid="_x0000_s20882" name="Equation" r:id="rId3" imgW="3492360" imgH="571320" progId="Equation.3">
                   <p:embed/>
                 </p:oleObj>
               </mc:Choice>
@@ -17503,7 +17518,7 @@
           <a:graphicData uri="http://schemas.openxmlformats.org/presentationml/2006/ole">
             <mc:AlternateContent xmlns:mc="http://schemas.openxmlformats.org/markup-compatibility/2006">
               <mc:Choice xmlns:v="urn:schemas-microsoft-com:vml" Requires="v">
-                <p:oleObj spid="_x0000_s20859" name="Equation" r:id="rId5" imgW="2869920" imgH="444240" progId="Equation.3">
+                <p:oleObj spid="_x0000_s20883" name="Equation" r:id="rId5" imgW="2869920" imgH="444240" progId="Equation.3">
                   <p:embed/>
                 </p:oleObj>
               </mc:Choice>
@@ -17598,7 +17613,7 @@
           <a:graphicData uri="http://schemas.openxmlformats.org/presentationml/2006/ole">
             <mc:AlternateContent xmlns:mc="http://schemas.openxmlformats.org/markup-compatibility/2006">
               <mc:Choice xmlns:v="urn:schemas-microsoft-com:vml" Requires="v">
-                <p:oleObj spid="_x0000_s20860" name="Equation" r:id="rId7" imgW="2489040" imgH="533160" progId="Equation.3">
+                <p:oleObj spid="_x0000_s20884" name="Equation" r:id="rId7" imgW="2489040" imgH="533160" progId="Equation.3">
                   <p:embed/>
                 </p:oleObj>
               </mc:Choice>
@@ -19337,7 +19352,7 @@
           <a:graphicData uri="http://schemas.openxmlformats.org/presentationml/2006/ole">
             <mc:AlternateContent xmlns:mc="http://schemas.openxmlformats.org/markup-compatibility/2006">
               <mc:Choice xmlns:v="urn:schemas-microsoft-com:vml" Requires="v">
-                <p:oleObj spid="_x0000_s21760" name="Equation" r:id="rId3" imgW="2869920" imgH="444240" progId="Equation.3">
+                <p:oleObj spid="_x0000_s21776" name="Equation" r:id="rId3" imgW="2869920" imgH="444240" progId="Equation.3">
                   <p:embed/>
                 </p:oleObj>
               </mc:Choice>
@@ -19714,7 +19729,7 @@
             <a:graphicData uri="http://schemas.openxmlformats.org/presentationml/2006/ole">
               <mc:AlternateContent xmlns:mc="http://schemas.openxmlformats.org/markup-compatibility/2006">
                 <mc:Choice xmlns:v="urn:schemas-microsoft-com:vml" Requires="v">
-                  <p:oleObj spid="_x0000_s21761" name="Equation" r:id="rId5" imgW="3162240" imgH="444240" progId="Equation.3">
+                  <p:oleObj spid="_x0000_s21777" name="Equation" r:id="rId5" imgW="3162240" imgH="444240" progId="Equation.3">
                     <p:embed/>
                   </p:oleObj>
                 </mc:Choice>
@@ -20323,7 +20338,7 @@
           <a:graphicData uri="http://schemas.openxmlformats.org/presentationml/2006/ole">
             <mc:AlternateContent xmlns:mc="http://schemas.openxmlformats.org/markup-compatibility/2006">
               <mc:Choice xmlns:v="urn:schemas-microsoft-com:vml" Requires="v">
-                <p:oleObj spid="_x0000_s22894" name="Equation" r:id="rId3" imgW="3162240" imgH="444240" progId="Equation.3">
+                <p:oleObj spid="_x0000_s22918" name="Equation" r:id="rId3" imgW="3162240" imgH="444240" progId="Equation.3">
                   <p:embed/>
                 </p:oleObj>
               </mc:Choice>
@@ -20418,7 +20433,7 @@
           <a:graphicData uri="http://schemas.openxmlformats.org/presentationml/2006/ole">
             <mc:AlternateContent xmlns:mc="http://schemas.openxmlformats.org/markup-compatibility/2006">
               <mc:Choice xmlns:v="urn:schemas-microsoft-com:vml" Requires="v">
-                <p:oleObj spid="_x0000_s22895" name="Equation" r:id="rId5" imgW="1257120" imgH="368280" progId="Equation.3">
+                <p:oleObj spid="_x0000_s22919" name="Equation" r:id="rId5" imgW="1257120" imgH="368280" progId="Equation.3">
                   <p:embed/>
                 </p:oleObj>
               </mc:Choice>
@@ -20513,7 +20528,7 @@
           <a:graphicData uri="http://schemas.openxmlformats.org/presentationml/2006/ole">
             <mc:AlternateContent xmlns:mc="http://schemas.openxmlformats.org/markup-compatibility/2006">
               <mc:Choice xmlns:v="urn:schemas-microsoft-com:vml" Requires="v">
-                <p:oleObj spid="_x0000_s22896" name="Equation" r:id="rId7" imgW="1066800" imgH="431800" progId="Equation.3">
+                <p:oleObj spid="_x0000_s22920" name="Equation" r:id="rId7" imgW="1066800" imgH="431800" progId="Equation.3">
                   <p:embed/>
                 </p:oleObj>
               </mc:Choice>
@@ -21365,7 +21380,7 @@
           <a:graphicData uri="http://schemas.openxmlformats.org/presentationml/2006/ole">
             <mc:AlternateContent xmlns:mc="http://schemas.openxmlformats.org/markup-compatibility/2006">
               <mc:Choice xmlns:v="urn:schemas-microsoft-com:vml" Requires="v">
-                <p:oleObj spid="_x0000_s24281" name="Документ" r:id="rId3" imgW="6637197" imgH="2384447" progId="Word.Document.8">
+                <p:oleObj spid="_x0000_s24337" name="Документ" r:id="rId3" imgW="6637197" imgH="2384447" progId="Word.Document.8">
                   <p:embed/>
                 </p:oleObj>
               </mc:Choice>
@@ -21466,7 +21481,7 @@
           <a:graphicData uri="http://schemas.openxmlformats.org/presentationml/2006/ole">
             <mc:AlternateContent xmlns:mc="http://schemas.openxmlformats.org/markup-compatibility/2006">
               <mc:Choice xmlns:v="urn:schemas-microsoft-com:vml" Requires="v">
-                <p:oleObj spid="_x0000_s24282" name="Equation" r:id="rId5" imgW="457002" imgH="393529" progId="Equation.3">
+                <p:oleObj spid="_x0000_s24338" name="Equation" r:id="rId5" imgW="457002" imgH="393529" progId="Equation.3">
                   <p:embed/>
                 </p:oleObj>
               </mc:Choice>
@@ -21567,7 +21582,7 @@
           <a:graphicData uri="http://schemas.openxmlformats.org/presentationml/2006/ole">
             <mc:AlternateContent xmlns:mc="http://schemas.openxmlformats.org/markup-compatibility/2006">
               <mc:Choice xmlns:v="urn:schemas-microsoft-com:vml" Requires="v">
-                <p:oleObj spid="_x0000_s24283" name="Формула" r:id="rId7" imgW="672808" imgH="393529" progId="Equation.3">
+                <p:oleObj spid="_x0000_s24339" name="Формула" r:id="rId7" imgW="672808" imgH="393529" progId="Equation.3">
                   <p:embed/>
                 </p:oleObj>
               </mc:Choice>
@@ -21668,7 +21683,7 @@
           <a:graphicData uri="http://schemas.openxmlformats.org/presentationml/2006/ole">
             <mc:AlternateContent xmlns:mc="http://schemas.openxmlformats.org/markup-compatibility/2006">
               <mc:Choice xmlns:v="urn:schemas-microsoft-com:vml" Requires="v">
-                <p:oleObj spid="_x0000_s24284" name="Equation" r:id="rId9" imgW="2781000" imgH="431640" progId="Equation.3">
+                <p:oleObj spid="_x0000_s24340" name="Equation" r:id="rId9" imgW="2781000" imgH="431640" progId="Equation.3">
                   <p:embed/>
                 </p:oleObj>
               </mc:Choice>
@@ -21792,7 +21807,7 @@
           <a:graphicData uri="http://schemas.openxmlformats.org/presentationml/2006/ole">
             <mc:AlternateContent xmlns:mc="http://schemas.openxmlformats.org/markup-compatibility/2006">
               <mc:Choice xmlns:v="urn:schemas-microsoft-com:vml" Requires="v">
-                <p:oleObj spid="_x0000_s24285" name="Equation" r:id="rId11" imgW="1422360" imgH="228600" progId="Equation.3">
+                <p:oleObj spid="_x0000_s24341" name="Equation" r:id="rId11" imgW="1422360" imgH="228600" progId="Equation.3">
                   <p:embed/>
                 </p:oleObj>
               </mc:Choice>
@@ -21887,7 +21902,7 @@
           <a:graphicData uri="http://schemas.openxmlformats.org/presentationml/2006/ole">
             <mc:AlternateContent xmlns:mc="http://schemas.openxmlformats.org/markup-compatibility/2006">
               <mc:Choice xmlns:v="urn:schemas-microsoft-com:vml" Requires="v">
-                <p:oleObj spid="_x0000_s24286" name="Equation" r:id="rId13" imgW="1334520" imgH="200880" progId="Equation.3">
+                <p:oleObj spid="_x0000_s24342" name="Equation" r:id="rId13" imgW="1334520" imgH="200880" progId="Equation.3">
                   <p:embed/>
                 </p:oleObj>
               </mc:Choice>
@@ -21988,7 +22003,7 @@
           <a:graphicData uri="http://schemas.openxmlformats.org/presentationml/2006/ole">
             <mc:AlternateContent xmlns:mc="http://schemas.openxmlformats.org/markup-compatibility/2006">
               <mc:Choice xmlns:v="urn:schemas-microsoft-com:vml" Requires="v">
-                <p:oleObj spid="_x0000_s24287" name="Equation" r:id="rId15" imgW="1066800" imgH="431800" progId="Equation.3">
+                <p:oleObj spid="_x0000_s24343" name="Equation" r:id="rId15" imgW="1066800" imgH="431800" progId="Equation.3">
                   <p:embed/>
                 </p:oleObj>
               </mc:Choice>
@@ -22574,7 +22589,7 @@
           <a:graphicData uri="http://schemas.openxmlformats.org/presentationml/2006/ole">
             <mc:AlternateContent xmlns:mc="http://schemas.openxmlformats.org/markup-compatibility/2006">
               <mc:Choice xmlns:v="urn:schemas-microsoft-com:vml" Requires="v">
-                <p:oleObj spid="_x0000_s24703" name="Equation" r:id="rId3" imgW="2234880" imgH="419040" progId="Equation.3">
+                <p:oleObj spid="_x0000_s24711" name="Equation" r:id="rId3" imgW="2234880" imgH="419040" progId="Equation.3">
                   <p:embed/>
                 </p:oleObj>
               </mc:Choice>
@@ -23094,7 +23109,7 @@
           <p:nvPr>
             <p:extLst>
               <p:ext uri="{D42A27DB-BD31-4B8C-83A1-F6EECF244321}">
-                <p14:modId xmlns:p14="http://schemas.microsoft.com/office/powerpoint/2010/main" val="1487589197"/>
+                <p14:modId xmlns:p14="http://schemas.microsoft.com/office/powerpoint/2010/main" val="3425934334"/>
               </p:ext>
             </p:extLst>
           </p:nvPr>
@@ -23107,12 +23122,12 @@
           <a:graphicData uri="http://schemas.openxmlformats.org/presentationml/2006/ole">
             <mc:AlternateContent xmlns:mc="http://schemas.openxmlformats.org/markup-compatibility/2006">
               <mc:Choice xmlns:v="urn:schemas-microsoft-com:vml" Requires="v">
-                <p:oleObj spid="_x0000_s25727" name="Equation" r:id="rId3" imgW="1206360" imgH="393480" progId="Equation.3">
+                <p:oleObj spid="_x0000_s25735" name="Equation" r:id="rId3" imgW="1206360" imgH="393480" progId="Equation.DSMT4">
                   <p:embed/>
                 </p:oleObj>
               </mc:Choice>
               <mc:Fallback>
-                <p:oleObj name="Equation" r:id="rId3" imgW="1206360" imgH="393480" progId="Equation.3">
+                <p:oleObj name="Equation" r:id="rId3" imgW="1206360" imgH="393480" progId="Equation.DSMT4">
                   <p:embed/>
                   <p:pic>
                     <p:nvPicPr>
@@ -24040,7 +24055,7 @@
           <a:graphicData uri="http://schemas.openxmlformats.org/presentationml/2006/ole">
             <mc:AlternateContent xmlns:mc="http://schemas.openxmlformats.org/markup-compatibility/2006">
               <mc:Choice xmlns:v="urn:schemas-microsoft-com:vml" Requires="v">
-                <p:oleObj spid="_x0000_s26749" name="Формула" r:id="rId3" imgW="1371600" imgH="431800" progId="Equation.3">
+                <p:oleObj spid="_x0000_s26757" name="Формула" r:id="rId3" imgW="1371600" imgH="431800" progId="Equation.3">
                   <p:embed/>
                 </p:oleObj>
               </mc:Choice>
@@ -24644,7 +24659,7 @@
           <a:graphicData uri="http://schemas.openxmlformats.org/presentationml/2006/ole">
             <mc:AlternateContent xmlns:mc="http://schemas.openxmlformats.org/markup-compatibility/2006">
               <mc:Choice xmlns:v="urn:schemas-microsoft-com:vml" Requires="v">
-                <p:oleObj spid="_x0000_s28797" name="Формула" r:id="rId3" imgW="1815312" imgH="444307" progId="Equation.3">
+                <p:oleObj spid="_x0000_s28805" name="Формула" r:id="rId3" imgW="1815312" imgH="444307" progId="Equation.3">
                   <p:embed/>
                 </p:oleObj>
               </mc:Choice>
@@ -25452,7 +25467,7 @@
           <a:graphicData uri="http://schemas.openxmlformats.org/presentationml/2006/ole">
             <mc:AlternateContent xmlns:mc="http://schemas.openxmlformats.org/markup-compatibility/2006">
               <mc:Choice xmlns:v="urn:schemas-microsoft-com:vml" Requires="v">
-                <p:oleObj spid="_x0000_s29821" name="Формула" r:id="rId4" imgW="2273300" imgH="419100" progId="Equation.3">
+                <p:oleObj spid="_x0000_s29829" name="Формула" r:id="rId4" imgW="2273300" imgH="419100" progId="Equation.3">
                   <p:embed/>
                 </p:oleObj>
               </mc:Choice>
@@ -33795,7 +33810,7 @@
           <a:graphicData uri="http://schemas.openxmlformats.org/presentationml/2006/ole">
             <mc:AlternateContent xmlns:mc="http://schemas.openxmlformats.org/markup-compatibility/2006">
               <mc:Choice xmlns:v="urn:schemas-microsoft-com:vml" Requires="v">
-                <p:oleObj spid="_x0000_s36090" name="Формула" r:id="rId3" imgW="4025900" imgH="1066800" progId="Equation.3">
+                <p:oleObj spid="_x0000_s36106" name="Формула" r:id="rId3" imgW="4025900" imgH="1066800" progId="Equation.3">
                   <p:embed/>
                 </p:oleObj>
               </mc:Choice>
@@ -34122,7 +34137,7 @@
           <a:graphicData uri="http://schemas.openxmlformats.org/presentationml/2006/ole">
             <mc:AlternateContent xmlns:mc="http://schemas.openxmlformats.org/markup-compatibility/2006">
               <mc:Choice xmlns:v="urn:schemas-microsoft-com:vml" Requires="v">
-                <p:oleObj spid="_x0000_s36091" name="Формула" r:id="rId5" imgW="3314700" imgH="1016000" progId="Equation.3">
+                <p:oleObj spid="_x0000_s36107" name="Формула" r:id="rId5" imgW="3314700" imgH="1016000" progId="Equation.3">
                   <p:embed/>
                 </p:oleObj>
               </mc:Choice>
@@ -35002,7 +35017,7 @@
           <a:graphicData uri="http://schemas.openxmlformats.org/presentationml/2006/ole">
             <mc:AlternateContent xmlns:mc="http://schemas.openxmlformats.org/markup-compatibility/2006">
               <mc:Choice xmlns:v="urn:schemas-microsoft-com:vml" Requires="v">
-                <p:oleObj spid="_x0000_s37113" name="Формула" r:id="rId3" imgW="3949700" imgH="482600" progId="Equation.3">
+                <p:oleObj spid="_x0000_s37129" name="Формула" r:id="rId3" imgW="3949700" imgH="482600" progId="Equation.3">
                   <p:embed/>
                 </p:oleObj>
               </mc:Choice>
@@ -35683,7 +35698,7 @@
             <a:graphicData uri="http://schemas.openxmlformats.org/presentationml/2006/ole">
               <mc:AlternateContent xmlns:mc="http://schemas.openxmlformats.org/markup-compatibility/2006">
                 <mc:Choice xmlns:v="urn:schemas-microsoft-com:vml" Requires="v">
-                  <p:oleObj spid="_x0000_s37114" name="Формула" r:id="rId5" imgW="2451100" imgH="457200" progId="Equation.3">
+                  <p:oleObj spid="_x0000_s37130" name="Формула" r:id="rId5" imgW="2451100" imgH="457200" progId="Equation.3">
                     <p:embed/>
                   </p:oleObj>
                 </mc:Choice>
@@ -36379,7 +36394,7 @@
           <a:graphicData uri="http://schemas.openxmlformats.org/presentationml/2006/ole">
             <mc:AlternateContent xmlns:mc="http://schemas.openxmlformats.org/markup-compatibility/2006">
               <mc:Choice xmlns:v="urn:schemas-microsoft-com:vml" Requires="v">
-                <p:oleObj spid="_x0000_s38012" name="Формула" r:id="rId3" imgW="3314700" imgH="1016000" progId="Equation.3">
+                <p:oleObj spid="_x0000_s38020" name="Формула" r:id="rId3" imgW="3314700" imgH="1016000" progId="Equation.3">
                   <p:embed/>
                 </p:oleObj>
               </mc:Choice>
@@ -36862,7 +36877,7 @@
           <a:graphicData uri="http://schemas.openxmlformats.org/presentationml/2006/ole">
             <mc:AlternateContent xmlns:mc="http://schemas.openxmlformats.org/markup-compatibility/2006">
               <mc:Choice xmlns:v="urn:schemas-microsoft-com:vml" Requires="v">
-                <p:oleObj spid="_x0000_s39037" name="Формула" r:id="rId3" imgW="3949700" imgH="482600" progId="Equation.3">
+                <p:oleObj spid="_x0000_s39045" name="Формула" r:id="rId3" imgW="3949700" imgH="482600" progId="Equation.3">
                   <p:embed/>
                 </p:oleObj>
               </mc:Choice>
@@ -37396,7 +37411,7 @@
           <a:graphicData uri="http://schemas.openxmlformats.org/presentationml/2006/ole">
             <mc:AlternateContent xmlns:mc="http://schemas.openxmlformats.org/markup-compatibility/2006">
               <mc:Choice xmlns:v="urn:schemas-microsoft-com:vml" Requires="v">
-                <p:oleObj spid="_x0000_s40061" name="Формула" r:id="rId3" imgW="3314700" imgH="1016000" progId="Equation.3">
+                <p:oleObj spid="_x0000_s40069" name="Формула" r:id="rId3" imgW="3314700" imgH="1016000" progId="Equation.3">
                   <p:embed/>
                 </p:oleObj>
               </mc:Choice>
@@ -37550,6 +37565,321 @@
       </p:grpSpPr>
       <p:sp>
         <p:nvSpPr>
+          <p:cNvPr id="39938" name="Rectangle 2"/>
+          <p:cNvSpPr>
+            <a:spLocks noGrp="1" noChangeArrowheads="1"/>
+          </p:cNvSpPr>
+          <p:nvPr>
+            <p:ph type="title"/>
+          </p:nvPr>
+        </p:nvSpPr>
+        <p:spPr/>
+        <p:txBody>
+          <a:bodyPr/>
+          <a:lstStyle/>
+          <a:p>
+            <a:pPr eaLnBrk="1" hangingPunct="1"/>
+            <a:r>
+              <a:rPr lang="vi-VN" sz="3600" dirty="0" smtClean="0"/>
+              <a:t>Bài tập</a:t>
+            </a:r>
+            <a:endParaRPr lang="vi-VN" sz="3600" dirty="0" smtClean="0"/>
+          </a:p>
+        </p:txBody>
+      </p:sp>
+      <p:sp>
+        <p:nvSpPr>
+          <p:cNvPr id="3" name="Slide Number Placeholder 2"/>
+          <p:cNvSpPr>
+            <a:spLocks noGrp="1"/>
+          </p:cNvSpPr>
+          <p:nvPr>
+            <p:ph type="sldNum" sz="quarter" idx="12"/>
+          </p:nvPr>
+        </p:nvSpPr>
+        <p:spPr/>
+        <p:txBody>
+          <a:bodyPr/>
+          <a:lstStyle/>
+          <a:p>
+            <a:pPr>
+              <a:defRPr/>
+            </a:pPr>
+            <a:fld id="{3A61A8D7-472F-4220-B835-9BCD656AC6A7}" type="slidenum">
+              <a:rPr lang="vi-VN" smtClean="0"/>
+              <a:pPr>
+                <a:defRPr/>
+              </a:pPr>
+              <a:t>36</a:t>
+            </a:fld>
+            <a:endParaRPr lang="vi-VN"/>
+          </a:p>
+        </p:txBody>
+      </p:sp>
+      <p:sp>
+        <p:nvSpPr>
+          <p:cNvPr id="7" name="Rectangle 3"/>
+          <p:cNvSpPr txBox="1">
+            <a:spLocks noChangeArrowheads="1"/>
+          </p:cNvSpPr>
+          <p:nvPr/>
+        </p:nvSpPr>
+        <p:spPr>
+          <a:xfrm>
+            <a:off x="611560" y="2017713"/>
+            <a:ext cx="8343528" cy="2274887"/>
+          </a:xfrm>
+          <a:prstGeom prst="rect">
+            <a:avLst/>
+          </a:prstGeom>
+        </p:spPr>
+        <p:txBody>
+          <a:bodyPr/>
+          <a:lstStyle>
+            <a:lvl1pPr marL="342900" indent="-342900" algn="l" rtl="0" eaLnBrk="0" fontAlgn="base" hangingPunct="0">
+              <a:spcBef>
+                <a:spcPct val="20000"/>
+              </a:spcBef>
+              <a:spcAft>
+                <a:spcPct val="0"/>
+              </a:spcAft>
+              <a:buClr>
+                <a:schemeClr val="folHlink"/>
+              </a:buClr>
+              <a:buSzPct val="60000"/>
+              <a:buFont typeface="Wingdings" panose="05000000000000000000" pitchFamily="2" charset="2"/>
+              <a:buChar char="n"/>
+              <a:defRPr sz="3200" kern="1200">
+                <a:solidFill>
+                  <a:schemeClr val="tx1"/>
+                </a:solidFill>
+                <a:latin typeface="+mn-lt"/>
+                <a:ea typeface="+mn-ea"/>
+                <a:cs typeface="+mn-cs"/>
+              </a:defRPr>
+            </a:lvl1pPr>
+            <a:lvl2pPr marL="742950" indent="-285750" algn="l" rtl="0" eaLnBrk="0" fontAlgn="base" hangingPunct="0">
+              <a:spcBef>
+                <a:spcPct val="20000"/>
+              </a:spcBef>
+              <a:spcAft>
+                <a:spcPct val="0"/>
+              </a:spcAft>
+              <a:buClr>
+                <a:schemeClr val="hlink"/>
+              </a:buClr>
+              <a:buSzPct val="55000"/>
+              <a:buFont typeface="Wingdings" panose="05000000000000000000" pitchFamily="2" charset="2"/>
+              <a:buChar char="n"/>
+              <a:defRPr sz="2800" kern="1200">
+                <a:solidFill>
+                  <a:schemeClr val="tx1"/>
+                </a:solidFill>
+                <a:latin typeface="+mn-lt"/>
+                <a:ea typeface="+mn-ea"/>
+                <a:cs typeface="+mn-cs"/>
+              </a:defRPr>
+            </a:lvl2pPr>
+            <a:lvl3pPr marL="1143000" indent="-228600" algn="l" rtl="0" eaLnBrk="0" fontAlgn="base" hangingPunct="0">
+              <a:spcBef>
+                <a:spcPct val="20000"/>
+              </a:spcBef>
+              <a:spcAft>
+                <a:spcPct val="0"/>
+              </a:spcAft>
+              <a:buClr>
+                <a:schemeClr val="folHlink"/>
+              </a:buClr>
+              <a:buSzPct val="50000"/>
+              <a:buFont typeface="Wingdings" panose="05000000000000000000" pitchFamily="2" charset="2"/>
+              <a:buChar char="n"/>
+              <a:defRPr sz="2400" kern="1200">
+                <a:solidFill>
+                  <a:schemeClr val="tx1"/>
+                </a:solidFill>
+                <a:latin typeface="+mn-lt"/>
+                <a:ea typeface="+mn-ea"/>
+                <a:cs typeface="+mn-cs"/>
+              </a:defRPr>
+            </a:lvl3pPr>
+            <a:lvl4pPr marL="1600200" indent="-228600" algn="l" rtl="0" eaLnBrk="0" fontAlgn="base" hangingPunct="0">
+              <a:spcBef>
+                <a:spcPct val="20000"/>
+              </a:spcBef>
+              <a:spcAft>
+                <a:spcPct val="0"/>
+              </a:spcAft>
+              <a:buClr>
+                <a:schemeClr val="accent2"/>
+              </a:buClr>
+              <a:buSzPct val="55000"/>
+              <a:buFont typeface="Wingdings" panose="05000000000000000000" pitchFamily="2" charset="2"/>
+              <a:buChar char="n"/>
+              <a:defRPr sz="2000" kern="1200">
+                <a:solidFill>
+                  <a:schemeClr val="tx1"/>
+                </a:solidFill>
+                <a:latin typeface="+mn-lt"/>
+                <a:ea typeface="+mn-ea"/>
+                <a:cs typeface="+mn-cs"/>
+              </a:defRPr>
+            </a:lvl4pPr>
+            <a:lvl5pPr marL="2057400" indent="-228600" algn="l" rtl="0" eaLnBrk="0" fontAlgn="base" hangingPunct="0">
+              <a:spcBef>
+                <a:spcPct val="20000"/>
+              </a:spcBef>
+              <a:spcAft>
+                <a:spcPct val="0"/>
+              </a:spcAft>
+              <a:buClr>
+                <a:schemeClr val="accent1"/>
+              </a:buClr>
+              <a:buSzPct val="50000"/>
+              <a:buFont typeface="Wingdings" panose="05000000000000000000" pitchFamily="2" charset="2"/>
+              <a:buChar char="n"/>
+              <a:defRPr sz="2000" kern="1200">
+                <a:solidFill>
+                  <a:schemeClr val="tx1"/>
+                </a:solidFill>
+                <a:latin typeface="+mn-lt"/>
+                <a:ea typeface="+mn-ea"/>
+                <a:cs typeface="+mn-cs"/>
+              </a:defRPr>
+            </a:lvl5pPr>
+            <a:lvl6pPr marL="2514600" indent="-228600" algn="l" defTabSz="914400" rtl="0" eaLnBrk="1" latinLnBrk="0" hangingPunct="1">
+              <a:lnSpc>
+                <a:spcPct val="90000"/>
+              </a:lnSpc>
+              <a:spcBef>
+                <a:spcPts val="500"/>
+              </a:spcBef>
+              <a:buFont typeface="Arial" panose="020B0604020202020204" pitchFamily="34" charset="0"/>
+              <a:buChar char="•"/>
+              <a:defRPr sz="1800" kern="1200">
+                <a:solidFill>
+                  <a:schemeClr val="tx1"/>
+                </a:solidFill>
+                <a:latin typeface="+mn-lt"/>
+                <a:ea typeface="+mn-ea"/>
+                <a:cs typeface="+mn-cs"/>
+              </a:defRPr>
+            </a:lvl6pPr>
+            <a:lvl7pPr marL="2971800" indent="-228600" algn="l" defTabSz="914400" rtl="0" eaLnBrk="1" latinLnBrk="0" hangingPunct="1">
+              <a:lnSpc>
+                <a:spcPct val="90000"/>
+              </a:lnSpc>
+              <a:spcBef>
+                <a:spcPts val="500"/>
+              </a:spcBef>
+              <a:buFont typeface="Arial" panose="020B0604020202020204" pitchFamily="34" charset="0"/>
+              <a:buChar char="•"/>
+              <a:defRPr sz="1800" kern="1200">
+                <a:solidFill>
+                  <a:schemeClr val="tx1"/>
+                </a:solidFill>
+                <a:latin typeface="+mn-lt"/>
+                <a:ea typeface="+mn-ea"/>
+                <a:cs typeface="+mn-cs"/>
+              </a:defRPr>
+            </a:lvl7pPr>
+            <a:lvl8pPr marL="3429000" indent="-228600" algn="l" defTabSz="914400" rtl="0" eaLnBrk="1" latinLnBrk="0" hangingPunct="1">
+              <a:lnSpc>
+                <a:spcPct val="90000"/>
+              </a:lnSpc>
+              <a:spcBef>
+                <a:spcPts val="500"/>
+              </a:spcBef>
+              <a:buFont typeface="Arial" panose="020B0604020202020204" pitchFamily="34" charset="0"/>
+              <a:buChar char="•"/>
+              <a:defRPr sz="1800" kern="1200">
+                <a:solidFill>
+                  <a:schemeClr val="tx1"/>
+                </a:solidFill>
+                <a:latin typeface="+mn-lt"/>
+                <a:ea typeface="+mn-ea"/>
+                <a:cs typeface="+mn-cs"/>
+              </a:defRPr>
+            </a:lvl8pPr>
+            <a:lvl9pPr marL="3886200" indent="-228600" algn="l" defTabSz="914400" rtl="0" eaLnBrk="1" latinLnBrk="0" hangingPunct="1">
+              <a:lnSpc>
+                <a:spcPct val="90000"/>
+              </a:lnSpc>
+              <a:spcBef>
+                <a:spcPts val="500"/>
+              </a:spcBef>
+              <a:buFont typeface="Arial" panose="020B0604020202020204" pitchFamily="34" charset="0"/>
+              <a:buChar char="•"/>
+              <a:defRPr sz="1800" kern="1200">
+                <a:solidFill>
+                  <a:schemeClr val="tx1"/>
+                </a:solidFill>
+                <a:latin typeface="+mn-lt"/>
+                <a:ea typeface="+mn-ea"/>
+                <a:cs typeface="+mn-cs"/>
+              </a:defRPr>
+            </a:lvl9pPr>
+          </a:lstStyle>
+          <a:p>
+            <a:pPr algn="just" eaLnBrk="1" hangingPunct="1"/>
+            <a:r>
+              <a:rPr lang="vi-VN" sz="2800" b="0" dirty="0" smtClean="0"/>
+              <a:t>So sánh sự khác biệt giữa trọng số tf-idf của mô hình không gian vec-tơ chuẩn và mô hình</a:t>
+            </a:r>
+            <a:r>
+              <a:rPr lang="en-US" sz="2800" b="0" dirty="0" smtClean="0"/>
+              <a:t> BIM (</a:t>
+            </a:r>
+            <a:r>
+              <a:rPr lang="vi-VN" sz="2800" b="0" dirty="0" smtClean="0"/>
+              <a:t>trong trường hợp không có thông tin về văn bản phù hợp</a:t>
+            </a:r>
+            <a:r>
+              <a:rPr lang="en-US" sz="2800" b="0" dirty="0" smtClean="0"/>
+              <a:t>).</a:t>
+            </a:r>
+            <a:endParaRPr lang="en-US" sz="2400" b="0" dirty="0" smtClean="0"/>
+          </a:p>
+        </p:txBody>
+      </p:sp>
+    </p:spTree>
+    <p:extLst>
+      <p:ext uri="{BB962C8B-B14F-4D97-AF65-F5344CB8AC3E}">
+        <p14:creationId xmlns:p14="http://schemas.microsoft.com/office/powerpoint/2010/main" val="1865984535"/>
+      </p:ext>
+    </p:extLst>
+  </p:cSld>
+  <p:clrMapOvr>
+    <a:masterClrMapping/>
+  </p:clrMapOvr>
+  <p:timing>
+    <p:tnLst>
+      <p:par>
+        <p:cTn id="1" dur="indefinite" restart="never" nodeType="tmRoot"/>
+      </p:par>
+    </p:tnLst>
+  </p:timing>
+</p:sld>
+</file>
+
+<file path=ppt/slides/slide37.xml><?xml version="1.0" encoding="utf-8"?>
+<p:sld xmlns:a="http://schemas.openxmlformats.org/drawingml/2006/main" xmlns:r="http://schemas.openxmlformats.org/officeDocument/2006/relationships" xmlns:p="http://schemas.openxmlformats.org/presentationml/2006/main">
+  <p:cSld>
+    <p:spTree>
+      <p:nvGrpSpPr>
+        <p:cNvPr id="1" name=""/>
+        <p:cNvGrpSpPr/>
+        <p:nvPr/>
+      </p:nvGrpSpPr>
+      <p:grpSpPr>
+        <a:xfrm>
+          <a:off x="0" y="0"/>
+          <a:ext cx="0" cy="0"/>
+          <a:chOff x="0" y="0"/>
+          <a:chExt cx="0" cy="0"/>
+        </a:xfrm>
+      </p:grpSpPr>
+      <p:sp>
+        <p:nvSpPr>
           <p:cNvPr id="40962" name="Rectangle 2"/>
           <p:cNvSpPr>
             <a:spLocks noGrp="1" noChangeArrowheads="1"/>
@@ -37645,7 +37975,7 @@
               <a:pPr>
                 <a:defRPr/>
               </a:pPr>
-              <a:t>36</a:t>
+              <a:t>37</a:t>
             </a:fld>
             <a:endParaRPr lang="vi-VN"/>
           </a:p>
@@ -42146,7 +42476,7 @@
   </a:extraClrSchemeLst>
   <a:extLst>
     <a:ext uri="{05A4C25C-085E-4340-85A3-A5531E510DB2}">
-      <thm15:themeFamily xmlns:thm15="http://schemas.microsoft.com/office/thememl/2012/main" xmlns="" name="Office Theme" id="{62F939B6-93AF-4DB8-9C6B-D6C7DFDC589F}" vid="{4A3C46E8-61CC-4603-A589-7422A47A8E4A}"/>
+      <thm15:themeFamily xmlns:thm15="http://schemas.microsoft.com/office/thememl/2012/main" name="Office Theme" id="{62F939B6-93AF-4DB8-9C6B-D6C7DFDC589F}" vid="{4A3C46E8-61CC-4603-A589-7422A47A8E4A}"/>
     </a:ext>
   </a:extLst>
 </a:theme>
@@ -42407,7 +42737,7 @@
   <a:extraClrSchemeLst/>
   <a:extLst>
     <a:ext uri="{05A4C25C-085E-4340-85A3-A5531E510DB2}">
-      <thm15:themeFamily xmlns:thm15="http://schemas.microsoft.com/office/thememl/2012/main" xmlns="" name="Office Theme" id="{62F939B6-93AF-4DB8-9C6B-D6C7DFDC589F}" vid="{4A3C46E8-61CC-4603-A589-7422A47A8E4A}"/>
+      <thm15:themeFamily xmlns:thm15="http://schemas.microsoft.com/office/thememl/2012/main" name="Office Theme" id="{62F939B6-93AF-4DB8-9C6B-D6C7DFDC589F}" vid="{4A3C46E8-61CC-4603-A589-7422A47A8E4A}"/>
     </a:ext>
   </a:extLst>
 </a:theme>

</xml_diff>

<commit_message>
Điều chỉnh bài 5
</commit_message>
<xml_diff>
--- a/Bai 5 BIM va Okapi BM25.pptx
+++ b/Bai 5 BIM va Okapi BM25.pptx
@@ -175,7 +175,7 @@
   </p:defaultTextStyle>
   <p:extLst>
     <p:ext uri="{EFAFB233-063F-42B5-8137-9DF3F51BA10A}">
-      <p15:sldGuideLst xmlns:p15="http://schemas.microsoft.com/office/powerpoint/2012/main" xmlns="">
+      <p15:sldGuideLst xmlns="" xmlns:p15="http://schemas.microsoft.com/office/powerpoint/2012/main">
         <p15:guide id="1" orient="horz" pos="2160">
           <p15:clr>
             <a:srgbClr val="A4A3A4"/>
@@ -7777,7 +7777,7 @@
           <a:graphicData uri="http://schemas.openxmlformats.org/presentationml/2006/ole">
             <mc:AlternateContent xmlns:mc="http://schemas.openxmlformats.org/markup-compatibility/2006">
               <mc:Choice xmlns:v="urn:schemas-microsoft-com:vml" Requires="v">
-                <p:oleObj spid="_x0000_s12825" name="Equation" r:id="rId3" imgW="1218960" imgH="203040" progId="Equation.3">
+                <p:oleObj spid="_x0000_s13001" name="Equation" r:id="rId3" imgW="1218960" imgH="203040" progId="Equation.3">
                   <p:embed/>
                 </p:oleObj>
               </mc:Choice>
@@ -7870,7 +7870,7 @@
           <a:graphicData uri="http://schemas.openxmlformats.org/presentationml/2006/ole">
             <mc:AlternateContent xmlns:mc="http://schemas.openxmlformats.org/markup-compatibility/2006">
               <mc:Choice xmlns:v="urn:schemas-microsoft-com:vml" Requires="v">
-                <p:oleObj spid="_x0000_s12826" name="Equation" r:id="rId5" imgW="1524000" imgH="419100" progId="Equation.3">
+                <p:oleObj spid="_x0000_s13002" name="Equation" r:id="rId5" imgW="1524000" imgH="419100" progId="Equation.3">
                   <p:embed/>
                 </p:oleObj>
               </mc:Choice>
@@ -8212,7 +8212,7 @@
           <a:graphicData uri="http://schemas.openxmlformats.org/presentationml/2006/ole">
             <mc:AlternateContent xmlns:mc="http://schemas.openxmlformats.org/markup-compatibility/2006">
               <mc:Choice xmlns:v="urn:schemas-microsoft-com:vml" Requires="v">
-                <p:oleObj spid="_x0000_s12827" name="Equation" r:id="rId7" imgW="1473200" imgH="203200" progId="Equation.3">
+                <p:oleObj spid="_x0000_s13003" name="Equation" r:id="rId7" imgW="1473200" imgH="203200" progId="Equation.3">
                   <p:embed/>
                 </p:oleObj>
               </mc:Choice>
@@ -8311,7 +8311,7 @@
           <a:graphicData uri="http://schemas.openxmlformats.org/presentationml/2006/ole">
             <mc:AlternateContent xmlns:mc="http://schemas.openxmlformats.org/markup-compatibility/2006">
               <mc:Choice xmlns:v="urn:schemas-microsoft-com:vml" Requires="v">
-                <p:oleObj spid="_x0000_s12828" name="Equation" r:id="rId9" imgW="1473200" imgH="203200" progId="Equation.3">
+                <p:oleObj spid="_x0000_s13004" name="Equation" r:id="rId9" imgW="1473200" imgH="203200" progId="Equation.3">
                   <p:embed/>
                 </p:oleObj>
               </mc:Choice>
@@ -8548,7 +8548,7 @@
             <a:graphicData uri="http://schemas.openxmlformats.org/presentationml/2006/ole">
               <mc:AlternateContent xmlns:mc="http://schemas.openxmlformats.org/markup-compatibility/2006">
                 <mc:Choice xmlns:v="urn:schemas-microsoft-com:vml" Requires="v">
-                  <p:oleObj spid="_x0000_s13613" name="Формула" r:id="rId3" imgW="1574800" imgH="241300" progId="Equation.3">
+                  <p:oleObj spid="_x0000_s13701" name="Формула" r:id="rId3" imgW="1574800" imgH="241300" progId="Equation.3">
                     <p:embed/>
                   </p:oleObj>
                 </mc:Choice>
@@ -8885,7 +8885,7 @@
           <a:graphicData uri="http://schemas.openxmlformats.org/presentationml/2006/ole">
             <mc:AlternateContent xmlns:mc="http://schemas.openxmlformats.org/markup-compatibility/2006">
               <mc:Choice xmlns:v="urn:schemas-microsoft-com:vml" Requires="v">
-                <p:oleObj spid="_x0000_s13614" name="Equation" r:id="rId5" imgW="2501900" imgH="558800" progId="Equation.3">
+                <p:oleObj spid="_x0000_s13702" name="Equation" r:id="rId5" imgW="2501900" imgH="558800" progId="Equation.3">
                   <p:embed/>
                 </p:oleObj>
               </mc:Choice>
@@ -9936,7 +9936,7 @@
           <a:graphicData uri="http://schemas.openxmlformats.org/presentationml/2006/ole">
             <mc:AlternateContent xmlns:mc="http://schemas.openxmlformats.org/markup-compatibility/2006">
               <mc:Choice xmlns:v="urn:schemas-microsoft-com:vml" Requires="v">
-                <p:oleObj spid="_x0000_s14475" name="Формула" r:id="rId3" imgW="1524000" imgH="431800" progId="Equation.3">
+                <p:oleObj spid="_x0000_s14519" name="Формула" r:id="rId3" imgW="1524000" imgH="431800" progId="Equation.3">
                   <p:embed/>
                 </p:oleObj>
               </mc:Choice>
@@ -11066,6 +11066,10 @@
               <a:rPr lang="en-US" sz="2800" dirty="0" err="1" smtClean="0"/>
               <a:t>lại</a:t>
             </a:r>
+            <a:r>
+              <a:rPr lang="en-US" sz="2800" dirty="0" smtClean="0"/>
+              <a:t>;</a:t>
+            </a:r>
             <a:endParaRPr lang="en-US" sz="2800" dirty="0" smtClean="0"/>
           </a:p>
           <a:p>
@@ -11169,6 +11173,10 @@
             <a:r>
               <a:rPr lang="en-US" sz="2800" dirty="0" err="1" smtClean="0"/>
               <a:t>vec-tơ</a:t>
+            </a:r>
+            <a:r>
+              <a:rPr lang="en-US" sz="2800" dirty="0" smtClean="0"/>
+              <a:t>.</a:t>
             </a:r>
             <a:endParaRPr lang="vi-VN" sz="2800" dirty="0" smtClean="0"/>
           </a:p>
@@ -11196,7 +11204,7 @@
           <a:graphicData uri="http://schemas.openxmlformats.org/presentationml/2006/ole">
             <mc:AlternateContent xmlns:mc="http://schemas.openxmlformats.org/markup-compatibility/2006">
               <mc:Choice xmlns:v="urn:schemas-microsoft-com:vml" Requires="v">
-                <p:oleObj spid="_x0000_s15497" name="Equation" r:id="rId3" imgW="914400" imgH="266400" progId="Equation.3">
+                <p:oleObj spid="_x0000_s15541" name="Equation" r:id="rId3" imgW="914400" imgH="266400" progId="Equation.3">
                   <p:embed/>
                 </p:oleObj>
               </mc:Choice>
@@ -11719,7 +11727,7 @@
           <a:graphicData uri="http://schemas.openxmlformats.org/presentationml/2006/ole">
             <mc:AlternateContent xmlns:mc="http://schemas.openxmlformats.org/markup-compatibility/2006">
               <mc:Choice xmlns:v="urn:schemas-microsoft-com:vml" Requires="v">
-                <p:oleObj spid="_x0000_s16521" name="Equation" r:id="rId3" imgW="3454200" imgH="812520" progId="Equation.3">
+                <p:oleObj spid="_x0000_s16565" name="Equation" r:id="rId3" imgW="3454200" imgH="812520" progId="Equation.3">
                   <p:embed/>
                 </p:oleObj>
               </mc:Choice>
@@ -12993,7 +13001,7 @@
           <a:graphicData uri="http://schemas.openxmlformats.org/presentationml/2006/ole">
             <mc:AlternateContent xmlns:mc="http://schemas.openxmlformats.org/markup-compatibility/2006">
               <mc:Choice xmlns:v="urn:schemas-microsoft-com:vml" Requires="v">
-                <p:oleObj spid="_x0000_s17817" name="Equation" r:id="rId3" imgW="2489040" imgH="444240" progId="Equation.3">
+                <p:oleObj spid="_x0000_s17949" name="Equation" r:id="rId3" imgW="2489040" imgH="444240" progId="Equation.3">
                   <p:embed/>
                 </p:oleObj>
               </mc:Choice>
@@ -13088,7 +13096,7 @@
           <a:graphicData uri="http://schemas.openxmlformats.org/presentationml/2006/ole">
             <mc:AlternateContent xmlns:mc="http://schemas.openxmlformats.org/markup-compatibility/2006">
               <mc:Choice xmlns:v="urn:schemas-microsoft-com:vml" Requires="v">
-                <p:oleObj spid="_x0000_s17818" name="Equation" r:id="rId5" imgW="2171520" imgH="444240" progId="Equation.3">
+                <p:oleObj spid="_x0000_s17950" name="Equation" r:id="rId5" imgW="2171520" imgH="444240" progId="Equation.3">
                   <p:embed/>
                 </p:oleObj>
               </mc:Choice>
@@ -13183,7 +13191,7 @@
           <a:graphicData uri="http://schemas.openxmlformats.org/presentationml/2006/ole">
             <mc:AlternateContent xmlns:mc="http://schemas.openxmlformats.org/markup-compatibility/2006">
               <mc:Choice xmlns:v="urn:schemas-microsoft-com:vml" Requires="v">
-                <p:oleObj spid="_x0000_s17819" name="Equation" r:id="rId7" imgW="3530520" imgH="419040" progId="Equation.3">
+                <p:oleObj spid="_x0000_s17951" name="Equation" r:id="rId7" imgW="3530520" imgH="419040" progId="Equation.3">
                   <p:embed/>
                 </p:oleObj>
               </mc:Choice>
@@ -13423,7 +13431,7 @@
             <a:graphicData uri="http://schemas.openxmlformats.org/presentationml/2006/ole">
               <mc:AlternateContent xmlns:mc="http://schemas.openxmlformats.org/markup-compatibility/2006">
                 <mc:Choice xmlns:v="urn:schemas-microsoft-com:vml" Requires="v">
-                  <p:oleObj spid="_x0000_s19107" name="Equation" r:id="rId3" imgW="2489040" imgH="444240" progId="Equation.3">
+                  <p:oleObj spid="_x0000_s19327" name="Equation" r:id="rId3" imgW="2489040" imgH="444240" progId="Equation.3">
                     <p:embed/>
                   </p:oleObj>
                 </mc:Choice>
@@ -13518,7 +13526,7 @@
             <a:graphicData uri="http://schemas.openxmlformats.org/presentationml/2006/ole">
               <mc:AlternateContent xmlns:mc="http://schemas.openxmlformats.org/markup-compatibility/2006">
                 <mc:Choice xmlns:v="urn:schemas-microsoft-com:vml" Requires="v">
-                  <p:oleObj spid="_x0000_s19108" name="Equation" r:id="rId5" imgW="4089240" imgH="469800" progId="Equation.3">
+                  <p:oleObj spid="_x0000_s19328" name="Equation" r:id="rId5" imgW="4089240" imgH="469800" progId="Equation.3">
                     <p:embed/>
                   </p:oleObj>
                 </mc:Choice>
@@ -13918,7 +13926,7 @@
           <a:graphicData uri="http://schemas.openxmlformats.org/presentationml/2006/ole">
             <mc:AlternateContent xmlns:mc="http://schemas.openxmlformats.org/markup-compatibility/2006">
               <mc:Choice xmlns:v="urn:schemas-microsoft-com:vml" Requires="v">
-                <p:oleObj spid="_x0000_s19109" name="Equation" r:id="rId7" imgW="1422360" imgH="228600" progId="Equation.3">
+                <p:oleObj spid="_x0000_s19329" name="Equation" r:id="rId7" imgW="1422360" imgH="228600" progId="Equation.3">
                   <p:embed/>
                 </p:oleObj>
               </mc:Choice>
@@ -14013,7 +14021,7 @@
           <a:graphicData uri="http://schemas.openxmlformats.org/presentationml/2006/ole">
             <mc:AlternateContent xmlns:mc="http://schemas.openxmlformats.org/markup-compatibility/2006">
               <mc:Choice xmlns:v="urn:schemas-microsoft-com:vml" Requires="v">
-                <p:oleObj spid="_x0000_s19110" name="Equation" r:id="rId9" imgW="1334520" imgH="200880" progId="Equation.3">
+                <p:oleObj spid="_x0000_s19330" name="Equation" r:id="rId9" imgW="1334520" imgH="200880" progId="Equation.3">
                   <p:embed/>
                 </p:oleObj>
               </mc:Choice>
@@ -14114,7 +14122,7 @@
           <a:graphicData uri="http://schemas.openxmlformats.org/presentationml/2006/ole">
             <mc:AlternateContent xmlns:mc="http://schemas.openxmlformats.org/markup-compatibility/2006">
               <mc:Choice xmlns:v="urn:schemas-microsoft-com:vml" Requires="v">
-                <p:oleObj spid="_x0000_s19111" name="Equation" r:id="rId11" imgW="2489040" imgH="558720" progId="Equation.3">
+                <p:oleObj spid="_x0000_s19331" name="Equation" r:id="rId11" imgW="2489040" imgH="558720" progId="Equation.3">
                   <p:embed/>
                 </p:oleObj>
               </mc:Choice>
@@ -14871,7 +14879,7 @@
           <a:graphicData uri="http://schemas.openxmlformats.org/presentationml/2006/ole">
             <mc:AlternateContent xmlns:mc="http://schemas.openxmlformats.org/markup-compatibility/2006">
               <mc:Choice xmlns:v="urn:schemas-microsoft-com:vml" Requires="v">
-                <p:oleObj spid="_x0000_s19996" name="Equation" r:id="rId3" imgW="1384200" imgH="228600" progId="Equation.3">
+                <p:oleObj spid="_x0000_s20172" name="Equation" r:id="rId3" imgW="1384200" imgH="228600" progId="Equation.3">
                   <p:embed/>
                 </p:oleObj>
               </mc:Choice>
@@ -14937,7 +14945,7 @@
           <a:graphicData uri="http://schemas.openxmlformats.org/presentationml/2006/ole">
             <mc:AlternateContent xmlns:mc="http://schemas.openxmlformats.org/markup-compatibility/2006">
               <mc:Choice xmlns:v="urn:schemas-microsoft-com:vml" Requires="v">
-                <p:oleObj spid="_x0000_s19997" name="Equation" r:id="rId5" imgW="1358640" imgH="228600" progId="Equation.3">
+                <p:oleObj spid="_x0000_s20173" name="Equation" r:id="rId5" imgW="1358640" imgH="228600" progId="Equation.3">
                   <p:embed/>
                 </p:oleObj>
               </mc:Choice>
@@ -15003,7 +15011,7 @@
           <a:graphicData uri="http://schemas.openxmlformats.org/presentationml/2006/ole">
             <mc:AlternateContent xmlns:mc="http://schemas.openxmlformats.org/markup-compatibility/2006">
               <mc:Choice xmlns:v="urn:schemas-microsoft-com:vml" Requires="v">
-                <p:oleObj spid="_x0000_s19998" name="Equation" r:id="rId7" imgW="1587240" imgH="228600" progId="Equation.3">
+                <p:oleObj spid="_x0000_s20174" name="Equation" r:id="rId7" imgW="1587240" imgH="228600" progId="Equation.3">
                   <p:embed/>
                 </p:oleObj>
               </mc:Choice>
@@ -15069,7 +15077,7 @@
           <a:graphicData uri="http://schemas.openxmlformats.org/presentationml/2006/ole">
             <mc:AlternateContent xmlns:mc="http://schemas.openxmlformats.org/markup-compatibility/2006">
               <mc:Choice xmlns:v="urn:schemas-microsoft-com:vml" Requires="v">
-                <p:oleObj spid="_x0000_s19999" name="Equation" r:id="rId9" imgW="1574640" imgH="228600" progId="Equation.3">
+                <p:oleObj spid="_x0000_s20175" name="Equation" r:id="rId9" imgW="1574640" imgH="228600" progId="Equation.3">
                   <p:embed/>
                 </p:oleObj>
               </mc:Choice>
@@ -17418,7 +17426,7 @@
           <a:graphicData uri="http://schemas.openxmlformats.org/presentationml/2006/ole">
             <mc:AlternateContent xmlns:mc="http://schemas.openxmlformats.org/markup-compatibility/2006">
               <mc:Choice xmlns:v="urn:schemas-microsoft-com:vml" Requires="v">
-                <p:oleObj spid="_x0000_s20897" name="Equation" r:id="rId3" imgW="3492360" imgH="571320" progId="Equation.3">
+                <p:oleObj spid="_x0000_s21029" name="Equation" r:id="rId3" imgW="3492360" imgH="571320" progId="Equation.3">
                   <p:embed/>
                 </p:oleObj>
               </mc:Choice>
@@ -17513,7 +17521,7 @@
           <a:graphicData uri="http://schemas.openxmlformats.org/presentationml/2006/ole">
             <mc:AlternateContent xmlns:mc="http://schemas.openxmlformats.org/markup-compatibility/2006">
               <mc:Choice xmlns:v="urn:schemas-microsoft-com:vml" Requires="v">
-                <p:oleObj spid="_x0000_s20898" name="Equation" r:id="rId5" imgW="2869920" imgH="444240" progId="Equation.3">
+                <p:oleObj spid="_x0000_s21030" name="Equation" r:id="rId5" imgW="2869920" imgH="444240" progId="Equation.3">
                   <p:embed/>
                 </p:oleObj>
               </mc:Choice>
@@ -17608,7 +17616,7 @@
           <a:graphicData uri="http://schemas.openxmlformats.org/presentationml/2006/ole">
             <mc:AlternateContent xmlns:mc="http://schemas.openxmlformats.org/markup-compatibility/2006">
               <mc:Choice xmlns:v="urn:schemas-microsoft-com:vml" Requires="v">
-                <p:oleObj spid="_x0000_s20899" name="Equation" r:id="rId7" imgW="2489040" imgH="533160" progId="Equation.3">
+                <p:oleObj spid="_x0000_s21031" name="Equation" r:id="rId7" imgW="2489040" imgH="533160" progId="Equation.3">
                   <p:embed/>
                 </p:oleObj>
               </mc:Choice>
@@ -19347,7 +19355,7 @@
           <a:graphicData uri="http://schemas.openxmlformats.org/presentationml/2006/ole">
             <mc:AlternateContent xmlns:mc="http://schemas.openxmlformats.org/markup-compatibility/2006">
               <mc:Choice xmlns:v="urn:schemas-microsoft-com:vml" Requires="v">
-                <p:oleObj spid="_x0000_s21786" name="Equation" r:id="rId3" imgW="2869920" imgH="444240" progId="Equation.3">
+                <p:oleObj spid="_x0000_s21874" name="Equation" r:id="rId3" imgW="2869920" imgH="444240" progId="Equation.3">
                   <p:embed/>
                 </p:oleObj>
               </mc:Choice>
@@ -19724,7 +19732,7 @@
             <a:graphicData uri="http://schemas.openxmlformats.org/presentationml/2006/ole">
               <mc:AlternateContent xmlns:mc="http://schemas.openxmlformats.org/markup-compatibility/2006">
                 <mc:Choice xmlns:v="urn:schemas-microsoft-com:vml" Requires="v">
-                  <p:oleObj spid="_x0000_s21787" name="Equation" r:id="rId5" imgW="3162240" imgH="444240" progId="Equation.3">
+                  <p:oleObj spid="_x0000_s21875" name="Equation" r:id="rId5" imgW="3162240" imgH="444240" progId="Equation.3">
                     <p:embed/>
                   </p:oleObj>
                 </mc:Choice>
@@ -19908,7 +19916,7 @@
             </a:pPr>
             <a:r>
               <a:rPr lang="en-US" sz="2800" dirty="0" err="1" smtClean="0"/>
-              <a:t>Phương</a:t>
+              <a:t>Ứng</a:t>
             </a:r>
             <a:r>
               <a:rPr lang="en-US" sz="2800" dirty="0" smtClean="0"/>
@@ -19916,7 +19924,47 @@
             </a:r>
             <a:r>
               <a:rPr lang="en-US" sz="2800" dirty="0" err="1" smtClean="0"/>
-              <a:t>pháp</a:t>
+              <a:t>dụng</a:t>
+            </a:r>
+            <a:r>
+              <a:rPr lang="en-US" sz="2800" dirty="0" smtClean="0"/>
+              <a:t> </a:t>
+            </a:r>
+            <a:r>
+              <a:rPr lang="en-US" sz="2800" dirty="0" err="1" smtClean="0"/>
+              <a:t>lý</a:t>
+            </a:r>
+            <a:r>
+              <a:rPr lang="en-US" sz="2800" dirty="0" smtClean="0"/>
+              <a:t> </a:t>
+            </a:r>
+            <a:r>
+              <a:rPr lang="en-US" sz="2800" dirty="0" err="1" smtClean="0"/>
+              <a:t>thuyết</a:t>
+            </a:r>
+            <a:r>
+              <a:rPr lang="en-US" sz="2800" dirty="0" smtClean="0"/>
+              <a:t> </a:t>
+            </a:r>
+            <a:r>
+              <a:rPr lang="en-US" sz="2800" dirty="0" err="1" smtClean="0"/>
+              <a:t>xác</a:t>
+            </a:r>
+            <a:r>
+              <a:rPr lang="en-US" sz="2800" dirty="0" smtClean="0"/>
+              <a:t> </a:t>
+            </a:r>
+            <a:r>
+              <a:rPr lang="en-US" sz="2800" dirty="0" err="1" smtClean="0"/>
+              <a:t>suất</a:t>
+            </a:r>
+            <a:r>
+              <a:rPr lang="en-US" sz="2800" dirty="0" smtClean="0"/>
+              <a:t> </a:t>
+            </a:r>
+            <a:r>
+              <a:rPr lang="en-US" sz="2800" dirty="0" err="1" smtClean="0"/>
+              <a:t>trong</a:t>
             </a:r>
             <a:r>
               <a:rPr lang="en-US" sz="2800" dirty="0" smtClean="0"/>
@@ -19933,38 +19981,6 @@
             <a:r>
               <a:rPr lang="en-US" sz="2800" dirty="0" err="1" smtClean="0"/>
               <a:t>kiếm</a:t>
-            </a:r>
-            <a:r>
-              <a:rPr lang="en-US" sz="2800" dirty="0" smtClean="0"/>
-              <a:t> </a:t>
-            </a:r>
-            <a:r>
-              <a:rPr lang="en-US" sz="2800" dirty="0" err="1" smtClean="0"/>
-              <a:t>dựa</a:t>
-            </a:r>
-            <a:r>
-              <a:rPr lang="en-US" sz="2800" dirty="0" smtClean="0"/>
-              <a:t> </a:t>
-            </a:r>
-            <a:r>
-              <a:rPr lang="en-US" sz="2800" dirty="0" err="1" smtClean="0"/>
-              <a:t>trên</a:t>
-            </a:r>
-            <a:r>
-              <a:rPr lang="en-US" sz="2800" dirty="0" smtClean="0"/>
-              <a:t> </a:t>
-            </a:r>
-            <a:r>
-              <a:rPr lang="en-US" sz="2800" dirty="0" err="1" smtClean="0"/>
-              <a:t>xác</a:t>
-            </a:r>
-            <a:r>
-              <a:rPr lang="en-US" sz="2800" dirty="0" smtClean="0"/>
-              <a:t> </a:t>
-            </a:r>
-            <a:r>
-              <a:rPr lang="en-US" sz="2800" dirty="0" err="1" smtClean="0"/>
-              <a:t>suất</a:t>
             </a:r>
             <a:endParaRPr lang="en-US" sz="2800" dirty="0" smtClean="0"/>
           </a:p>
@@ -20333,7 +20349,7 @@
           <a:graphicData uri="http://schemas.openxmlformats.org/presentationml/2006/ole">
             <mc:AlternateContent xmlns:mc="http://schemas.openxmlformats.org/markup-compatibility/2006">
               <mc:Choice xmlns:v="urn:schemas-microsoft-com:vml" Requires="v">
-                <p:oleObj spid="_x0000_s22933" name="Equation" r:id="rId3" imgW="3162240" imgH="444240" progId="Equation.3">
+                <p:oleObj spid="_x0000_s23065" name="Equation" r:id="rId3" imgW="3162240" imgH="444240" progId="Equation.3">
                   <p:embed/>
                 </p:oleObj>
               </mc:Choice>
@@ -20428,7 +20444,7 @@
           <a:graphicData uri="http://schemas.openxmlformats.org/presentationml/2006/ole">
             <mc:AlternateContent xmlns:mc="http://schemas.openxmlformats.org/markup-compatibility/2006">
               <mc:Choice xmlns:v="urn:schemas-microsoft-com:vml" Requires="v">
-                <p:oleObj spid="_x0000_s22934" name="Equation" r:id="rId5" imgW="1257120" imgH="368280" progId="Equation.3">
+                <p:oleObj spid="_x0000_s23066" name="Equation" r:id="rId5" imgW="1257120" imgH="368280" progId="Equation.3">
                   <p:embed/>
                 </p:oleObj>
               </mc:Choice>
@@ -20523,7 +20539,7 @@
           <a:graphicData uri="http://schemas.openxmlformats.org/presentationml/2006/ole">
             <mc:AlternateContent xmlns:mc="http://schemas.openxmlformats.org/markup-compatibility/2006">
               <mc:Choice xmlns:v="urn:schemas-microsoft-com:vml" Requires="v">
-                <p:oleObj spid="_x0000_s22935" name="Equation" r:id="rId7" imgW="1066800" imgH="431800" progId="Equation.3">
+                <p:oleObj spid="_x0000_s23067" name="Equation" r:id="rId7" imgW="1066800" imgH="431800" progId="Equation.3">
                   <p:embed/>
                 </p:oleObj>
               </mc:Choice>
@@ -21375,7 +21391,7 @@
           <a:graphicData uri="http://schemas.openxmlformats.org/presentationml/2006/ole">
             <mc:AlternateContent xmlns:mc="http://schemas.openxmlformats.org/markup-compatibility/2006">
               <mc:Choice xmlns:v="urn:schemas-microsoft-com:vml" Requires="v">
-                <p:oleObj spid="_x0000_s24372" name="Документ" r:id="rId3" imgW="6637197" imgH="2384447" progId="Word.Document.8">
+                <p:oleObj spid="_x0000_s41064" name="Документ" r:id="rId3" imgW="6637197" imgH="2384447" progId="Word.Document.8">
                   <p:embed/>
                 </p:oleObj>
               </mc:Choice>
@@ -21476,7 +21492,7 @@
           <a:graphicData uri="http://schemas.openxmlformats.org/presentationml/2006/ole">
             <mc:AlternateContent xmlns:mc="http://schemas.openxmlformats.org/markup-compatibility/2006">
               <mc:Choice xmlns:v="urn:schemas-microsoft-com:vml" Requires="v">
-                <p:oleObj spid="_x0000_s24373" name="Equation" r:id="rId5" imgW="457002" imgH="393529" progId="Equation.3">
+                <p:oleObj spid="_x0000_s41065" name="Equation" r:id="rId5" imgW="457002" imgH="393529" progId="Equation.3">
                   <p:embed/>
                 </p:oleObj>
               </mc:Choice>
@@ -21577,7 +21593,7 @@
           <a:graphicData uri="http://schemas.openxmlformats.org/presentationml/2006/ole">
             <mc:AlternateContent xmlns:mc="http://schemas.openxmlformats.org/markup-compatibility/2006">
               <mc:Choice xmlns:v="urn:schemas-microsoft-com:vml" Requires="v">
-                <p:oleObj spid="_x0000_s24374" name="Формула" r:id="rId7" imgW="672808" imgH="393529" progId="Equation.3">
+                <p:oleObj spid="_x0000_s41066" name="Формула" r:id="rId7" imgW="672808" imgH="393529" progId="Equation.3">
                   <p:embed/>
                 </p:oleObj>
               </mc:Choice>
@@ -21678,7 +21694,7 @@
           <a:graphicData uri="http://schemas.openxmlformats.org/presentationml/2006/ole">
             <mc:AlternateContent xmlns:mc="http://schemas.openxmlformats.org/markup-compatibility/2006">
               <mc:Choice xmlns:v="urn:schemas-microsoft-com:vml" Requires="v">
-                <p:oleObj spid="_x0000_s24375" name="Equation" r:id="rId9" imgW="2781000" imgH="431640" progId="Equation.3">
+                <p:oleObj spid="_x0000_s41067" name="Equation" r:id="rId9" imgW="2781000" imgH="431640" progId="Equation.3">
                   <p:embed/>
                 </p:oleObj>
               </mc:Choice>
@@ -21802,7 +21818,7 @@
           <a:graphicData uri="http://schemas.openxmlformats.org/presentationml/2006/ole">
             <mc:AlternateContent xmlns:mc="http://schemas.openxmlformats.org/markup-compatibility/2006">
               <mc:Choice xmlns:v="urn:schemas-microsoft-com:vml" Requires="v">
-                <p:oleObj spid="_x0000_s24376" name="Equation" r:id="rId11" imgW="1422360" imgH="228600" progId="Equation.3">
+                <p:oleObj spid="_x0000_s41068" name="Equation" r:id="rId11" imgW="1422360" imgH="228600" progId="Equation.3">
                   <p:embed/>
                 </p:oleObj>
               </mc:Choice>
@@ -21897,7 +21913,7 @@
           <a:graphicData uri="http://schemas.openxmlformats.org/presentationml/2006/ole">
             <mc:AlternateContent xmlns:mc="http://schemas.openxmlformats.org/markup-compatibility/2006">
               <mc:Choice xmlns:v="urn:schemas-microsoft-com:vml" Requires="v">
-                <p:oleObj spid="_x0000_s24377" name="Equation" r:id="rId13" imgW="1334520" imgH="200880" progId="Equation.3">
+                <p:oleObj spid="_x0000_s41069" name="Equation" r:id="rId13" imgW="1334520" imgH="200880" progId="Equation.3">
                   <p:embed/>
                 </p:oleObj>
               </mc:Choice>
@@ -21998,7 +22014,7 @@
           <a:graphicData uri="http://schemas.openxmlformats.org/presentationml/2006/ole">
             <mc:AlternateContent xmlns:mc="http://schemas.openxmlformats.org/markup-compatibility/2006">
               <mc:Choice xmlns:v="urn:schemas-microsoft-com:vml" Requires="v">
-                <p:oleObj spid="_x0000_s24378" name="Equation" r:id="rId15" imgW="1066800" imgH="431800" progId="Equation.3">
+                <p:oleObj spid="_x0000_s41070" name="Equation" r:id="rId15" imgW="1066800" imgH="431800" progId="Equation.3">
                   <p:embed/>
                 </p:oleObj>
               </mc:Choice>
@@ -22584,7 +22600,7 @@
           <a:graphicData uri="http://schemas.openxmlformats.org/presentationml/2006/ole">
             <mc:AlternateContent xmlns:mc="http://schemas.openxmlformats.org/markup-compatibility/2006">
               <mc:Choice xmlns:v="urn:schemas-microsoft-com:vml" Requires="v">
-                <p:oleObj spid="_x0000_s24716" name="Equation" r:id="rId3" imgW="2234880" imgH="419040" progId="Equation.3">
+                <p:oleObj spid="_x0000_s24760" name="Equation" r:id="rId3" imgW="2234880" imgH="419040" progId="Equation.3">
                   <p:embed/>
                 </p:oleObj>
               </mc:Choice>
@@ -23117,7 +23133,7 @@
           <a:graphicData uri="http://schemas.openxmlformats.org/presentationml/2006/ole">
             <mc:AlternateContent xmlns:mc="http://schemas.openxmlformats.org/markup-compatibility/2006">
               <mc:Choice xmlns:v="urn:schemas-microsoft-com:vml" Requires="v">
-                <p:oleObj spid="_x0000_s25740" name="Equation" r:id="rId3" imgW="1206360" imgH="393480" progId="Equation.DSMT4">
+                <p:oleObj spid="_x0000_s25784" name="Equation" r:id="rId3" imgW="1206360" imgH="393480" progId="Equation.DSMT4">
                   <p:embed/>
                 </p:oleObj>
               </mc:Choice>
@@ -24050,7 +24066,7 @@
           <a:graphicData uri="http://schemas.openxmlformats.org/presentationml/2006/ole">
             <mc:AlternateContent xmlns:mc="http://schemas.openxmlformats.org/markup-compatibility/2006">
               <mc:Choice xmlns:v="urn:schemas-microsoft-com:vml" Requires="v">
-                <p:oleObj spid="_x0000_s26762" name="Формула" r:id="rId3" imgW="1371600" imgH="431800" progId="Equation.3">
+                <p:oleObj spid="_x0000_s26806" name="Формула" r:id="rId3" imgW="1371600" imgH="431800" progId="Equation.3">
                   <p:embed/>
                 </p:oleObj>
               </mc:Choice>
@@ -24654,7 +24670,7 @@
           <a:graphicData uri="http://schemas.openxmlformats.org/presentationml/2006/ole">
             <mc:AlternateContent xmlns:mc="http://schemas.openxmlformats.org/markup-compatibility/2006">
               <mc:Choice xmlns:v="urn:schemas-microsoft-com:vml" Requires="v">
-                <p:oleObj spid="_x0000_s28810" name="Формула" r:id="rId3" imgW="1815312" imgH="444307" progId="Equation.3">
+                <p:oleObj spid="_x0000_s28854" name="Формула" r:id="rId3" imgW="1815312" imgH="444307" progId="Equation.3">
                   <p:embed/>
                 </p:oleObj>
               </mc:Choice>
@@ -25462,7 +25478,7 @@
           <a:graphicData uri="http://schemas.openxmlformats.org/presentationml/2006/ole">
             <mc:AlternateContent xmlns:mc="http://schemas.openxmlformats.org/markup-compatibility/2006">
               <mc:Choice xmlns:v="urn:schemas-microsoft-com:vml" Requires="v">
-                <p:oleObj spid="_x0000_s29834" name="Формула" r:id="rId4" imgW="2273300" imgH="419100" progId="Equation.3">
+                <p:oleObj spid="_x0000_s29878" name="Формула" r:id="rId4" imgW="2273300" imgH="419100" progId="Equation.3">
                   <p:embed/>
                 </p:oleObj>
               </mc:Choice>
@@ -27741,124 +27757,174 @@
           <a:p>
             <a:pPr eaLnBrk="1" hangingPunct="1"/>
             <a:r>
-              <a:rPr lang="en-US" sz="2800" dirty="0" err="1" smtClean="0">
-                <a:solidFill>
-                  <a:srgbClr val="B2B2B2"/>
+              <a:rPr lang="en-US" sz="2800" dirty="0" err="1">
+                <a:solidFill>
+                  <a:schemeClr val="bg1">
+                    <a:lumMod val="65000"/>
+                  </a:schemeClr>
                 </a:solidFill>
               </a:rPr>
-              <a:t>Phương</a:t>
-            </a:r>
-            <a:r>
-              <a:rPr lang="en-US" sz="2800" dirty="0" smtClean="0">
-                <a:solidFill>
-                  <a:srgbClr val="B2B2B2"/>
+              <a:t>Ứng</a:t>
+            </a:r>
+            <a:r>
+              <a:rPr lang="en-US" sz="2800" dirty="0">
+                <a:solidFill>
+                  <a:schemeClr val="bg1">
+                    <a:lumMod val="65000"/>
+                  </a:schemeClr>
                 </a:solidFill>
               </a:rPr>
               <a:t> </a:t>
             </a:r>
             <a:r>
-              <a:rPr lang="en-US" sz="2800" dirty="0" err="1" smtClean="0">
-                <a:solidFill>
-                  <a:srgbClr val="B2B2B2"/>
+              <a:rPr lang="en-US" sz="2800" dirty="0" err="1">
+                <a:solidFill>
+                  <a:schemeClr val="bg1">
+                    <a:lumMod val="65000"/>
+                  </a:schemeClr>
                 </a:solidFill>
               </a:rPr>
-              <a:t>pháp</a:t>
-            </a:r>
-            <a:r>
-              <a:rPr lang="en-US" sz="2800" dirty="0" smtClean="0">
-                <a:solidFill>
-                  <a:srgbClr val="B2B2B2"/>
+              <a:t>dụng</a:t>
+            </a:r>
+            <a:r>
+              <a:rPr lang="en-US" sz="2800" dirty="0">
+                <a:solidFill>
+                  <a:schemeClr val="bg1">
+                    <a:lumMod val="65000"/>
+                  </a:schemeClr>
                 </a:solidFill>
               </a:rPr>
               <a:t> </a:t>
             </a:r>
             <a:r>
-              <a:rPr lang="en-US" sz="2800" dirty="0" err="1" smtClean="0">
-                <a:solidFill>
-                  <a:srgbClr val="B2B2B2"/>
+              <a:rPr lang="en-US" sz="2800" dirty="0" err="1">
+                <a:solidFill>
+                  <a:schemeClr val="bg1">
+                    <a:lumMod val="65000"/>
+                  </a:schemeClr>
+                </a:solidFill>
+              </a:rPr>
+              <a:t>lý</a:t>
+            </a:r>
+            <a:r>
+              <a:rPr lang="en-US" sz="2800" dirty="0">
+                <a:solidFill>
+                  <a:schemeClr val="bg1">
+                    <a:lumMod val="65000"/>
+                  </a:schemeClr>
+                </a:solidFill>
+              </a:rPr>
+              <a:t> </a:t>
+            </a:r>
+            <a:r>
+              <a:rPr lang="en-US" sz="2800" dirty="0" err="1">
+                <a:solidFill>
+                  <a:schemeClr val="bg1">
+                    <a:lumMod val="65000"/>
+                  </a:schemeClr>
+                </a:solidFill>
+              </a:rPr>
+              <a:t>thuyết</a:t>
+            </a:r>
+            <a:r>
+              <a:rPr lang="en-US" sz="2800" dirty="0">
+                <a:solidFill>
+                  <a:schemeClr val="bg1">
+                    <a:lumMod val="65000"/>
+                  </a:schemeClr>
+                </a:solidFill>
+              </a:rPr>
+              <a:t> </a:t>
+            </a:r>
+            <a:r>
+              <a:rPr lang="en-US" sz="2800" dirty="0" err="1">
+                <a:solidFill>
+                  <a:schemeClr val="bg1">
+                    <a:lumMod val="65000"/>
+                  </a:schemeClr>
+                </a:solidFill>
+              </a:rPr>
+              <a:t>xác</a:t>
+            </a:r>
+            <a:r>
+              <a:rPr lang="en-US" sz="2800" dirty="0">
+                <a:solidFill>
+                  <a:schemeClr val="bg1">
+                    <a:lumMod val="65000"/>
+                  </a:schemeClr>
+                </a:solidFill>
+              </a:rPr>
+              <a:t> </a:t>
+            </a:r>
+            <a:r>
+              <a:rPr lang="en-US" sz="2800" dirty="0" err="1">
+                <a:solidFill>
+                  <a:schemeClr val="bg1">
+                    <a:lumMod val="65000"/>
+                  </a:schemeClr>
+                </a:solidFill>
+              </a:rPr>
+              <a:t>suất</a:t>
+            </a:r>
+            <a:r>
+              <a:rPr lang="en-US" sz="2800" dirty="0">
+                <a:solidFill>
+                  <a:schemeClr val="bg1">
+                    <a:lumMod val="65000"/>
+                  </a:schemeClr>
+                </a:solidFill>
+              </a:rPr>
+              <a:t> </a:t>
+            </a:r>
+            <a:r>
+              <a:rPr lang="en-US" sz="2800" dirty="0" err="1">
+                <a:solidFill>
+                  <a:schemeClr val="bg1">
+                    <a:lumMod val="65000"/>
+                  </a:schemeClr>
+                </a:solidFill>
+              </a:rPr>
+              <a:t>trong</a:t>
+            </a:r>
+            <a:r>
+              <a:rPr lang="en-US" sz="2800" dirty="0">
+                <a:solidFill>
+                  <a:schemeClr val="bg1">
+                    <a:lumMod val="65000"/>
+                  </a:schemeClr>
+                </a:solidFill>
+              </a:rPr>
+              <a:t> </a:t>
+            </a:r>
+            <a:r>
+              <a:rPr lang="en-US" sz="2800" dirty="0" err="1">
+                <a:solidFill>
+                  <a:schemeClr val="bg1">
+                    <a:lumMod val="65000"/>
+                  </a:schemeClr>
                 </a:solidFill>
               </a:rPr>
               <a:t>tìm</a:t>
             </a:r>
             <a:r>
-              <a:rPr lang="en-US" sz="2800" dirty="0" smtClean="0">
-                <a:solidFill>
-                  <a:srgbClr val="B2B2B2"/>
+              <a:rPr lang="en-US" sz="2800" dirty="0">
+                <a:solidFill>
+                  <a:schemeClr val="bg1">
+                    <a:lumMod val="65000"/>
+                  </a:schemeClr>
                 </a:solidFill>
               </a:rPr>
               <a:t> </a:t>
             </a:r>
             <a:r>
-              <a:rPr lang="en-US" sz="2800" dirty="0" err="1" smtClean="0">
-                <a:solidFill>
-                  <a:srgbClr val="B2B2B2"/>
+              <a:rPr lang="en-US" sz="2800">
+                <a:solidFill>
+                  <a:schemeClr val="bg1">
+                    <a:lumMod val="65000"/>
+                  </a:schemeClr>
                 </a:solidFill>
               </a:rPr>
               <a:t>kiếm</a:t>
-            </a:r>
-            <a:r>
-              <a:rPr lang="en-US" sz="2800" dirty="0" smtClean="0">
-                <a:solidFill>
-                  <a:srgbClr val="B2B2B2"/>
-                </a:solidFill>
-              </a:rPr>
-              <a:t> </a:t>
-            </a:r>
-            <a:r>
-              <a:rPr lang="en-US" sz="2800" dirty="0" err="1" smtClean="0">
-                <a:solidFill>
-                  <a:srgbClr val="B2B2B2"/>
-                </a:solidFill>
-              </a:rPr>
-              <a:t>dựa</a:t>
-            </a:r>
-            <a:r>
-              <a:rPr lang="en-US" sz="2800" dirty="0" smtClean="0">
-                <a:solidFill>
-                  <a:srgbClr val="B2B2B2"/>
-                </a:solidFill>
-              </a:rPr>
-              <a:t> </a:t>
-            </a:r>
-            <a:r>
-              <a:rPr lang="en-US" sz="2800" dirty="0" err="1" smtClean="0">
-                <a:solidFill>
-                  <a:srgbClr val="B2B2B2"/>
-                </a:solidFill>
-              </a:rPr>
-              <a:t>trên</a:t>
-            </a:r>
-            <a:r>
-              <a:rPr lang="en-US" sz="2800" dirty="0" smtClean="0">
-                <a:solidFill>
-                  <a:srgbClr val="B2B2B2"/>
-                </a:solidFill>
-              </a:rPr>
-              <a:t> </a:t>
-            </a:r>
-            <a:r>
-              <a:rPr lang="en-US" sz="2800" dirty="0" err="1" smtClean="0">
-                <a:solidFill>
-                  <a:srgbClr val="B2B2B2"/>
-                </a:solidFill>
-              </a:rPr>
-              <a:t>xác</a:t>
-            </a:r>
-            <a:r>
-              <a:rPr lang="en-US" sz="2800" dirty="0" smtClean="0">
-                <a:solidFill>
-                  <a:srgbClr val="B2B2B2"/>
-                </a:solidFill>
-              </a:rPr>
-              <a:t> </a:t>
-            </a:r>
-            <a:r>
-              <a:rPr lang="en-US" sz="2800" dirty="0" err="1" smtClean="0">
-                <a:solidFill>
-                  <a:srgbClr val="B2B2B2"/>
-                </a:solidFill>
-              </a:rPr>
-              <a:t>suất</a:t>
             </a:r>
             <a:endParaRPr lang="en-US" sz="2800" dirty="0" smtClean="0">
               <a:solidFill>
@@ -31785,215 +31851,71 @@
               <a:buNone/>
             </a:pPr>
             <a:r>
-              <a:rPr lang="en-US" sz="2400" b="0" dirty="0" err="1" smtClean="0">
+              <a:rPr lang="vi-VN" sz="2000" b="0" dirty="0" smtClean="0">
                 <a:solidFill>
                   <a:schemeClr val="tx2"/>
                 </a:solidFill>
               </a:rPr>
-              <a:t>Có</a:t>
-            </a:r>
-            <a:r>
-              <a:rPr lang="en-US" sz="2400" b="0" dirty="0" smtClean="0">
+              <a:t>Có thể </a:t>
+            </a:r>
+            <a:r>
+              <a:rPr lang="en-US" sz="2000" b="0" dirty="0" err="1" smtClean="0">
                 <a:solidFill>
                   <a:schemeClr val="tx2"/>
                 </a:solidFill>
               </a:rPr>
-              <a:t> </a:t>
-            </a:r>
-            <a:r>
-              <a:rPr lang="en-US" sz="2400" b="0" dirty="0" err="1">
+              <a:t>ứng</a:t>
+            </a:r>
+            <a:r>
+              <a:rPr lang="vi-VN" sz="2000" b="0" dirty="0" smtClean="0">
                 <a:solidFill>
                   <a:schemeClr val="tx2"/>
                 </a:solidFill>
               </a:rPr>
-              <a:t>thể</a:t>
-            </a:r>
-            <a:r>
-              <a:rPr lang="en-US" sz="2400" b="0" dirty="0">
+              <a:t> dụng </a:t>
+            </a:r>
+            <a:r>
+              <a:rPr lang="en-US" sz="2000" b="0" dirty="0" err="1" smtClean="0">
                 <a:solidFill>
                   <a:schemeClr val="tx2"/>
                 </a:solidFill>
               </a:rPr>
-              <a:t> </a:t>
-            </a:r>
-            <a:r>
-              <a:rPr lang="en-US" sz="2400" b="0" dirty="0" err="1">
+              <a:t>lý</a:t>
+            </a:r>
+            <a:r>
+              <a:rPr lang="en-US" sz="2000" b="0" dirty="0" smtClean="0">
                 <a:solidFill>
                   <a:schemeClr val="tx2"/>
                 </a:solidFill>
               </a:rPr>
-              <a:t>sử</a:t>
-            </a:r>
-            <a:r>
-              <a:rPr lang="en-US" sz="2400" b="0" dirty="0">
+              <a:t> </a:t>
+            </a:r>
+            <a:r>
+              <a:rPr lang="en-US" sz="2000" b="0" dirty="0" err="1" smtClean="0">
                 <a:solidFill>
                   <a:schemeClr val="tx2"/>
                 </a:solidFill>
               </a:rPr>
-              <a:t> </a:t>
-            </a:r>
-            <a:r>
-              <a:rPr lang="en-US" sz="2400" b="0" dirty="0" err="1">
+              <a:t>thuyết</a:t>
+            </a:r>
+            <a:r>
+              <a:rPr lang="en-US" sz="2000" b="0" dirty="0" smtClean="0">
                 <a:solidFill>
                   <a:schemeClr val="tx2"/>
                 </a:solidFill>
               </a:rPr>
-              <a:t>dụng</a:t>
-            </a:r>
-            <a:r>
-              <a:rPr lang="en-US" sz="2400" b="0" dirty="0">
+              <a:t> </a:t>
+            </a:r>
+            <a:r>
+              <a:rPr lang="vi-VN" sz="2000" b="0" dirty="0" smtClean="0">
                 <a:solidFill>
                   <a:schemeClr val="tx2"/>
                 </a:solidFill>
               </a:rPr>
-              <a:t> </a:t>
-            </a:r>
-            <a:r>
-              <a:rPr lang="en-US" sz="2400" b="0" dirty="0" err="1">
-                <a:solidFill>
-                  <a:schemeClr val="tx2"/>
-                </a:solidFill>
-              </a:rPr>
-              <a:t>xác</a:t>
-            </a:r>
-            <a:r>
-              <a:rPr lang="en-US" sz="2400" b="0" dirty="0">
-                <a:solidFill>
-                  <a:schemeClr val="tx2"/>
-                </a:solidFill>
-              </a:rPr>
-              <a:t> </a:t>
-            </a:r>
-            <a:r>
-              <a:rPr lang="en-US" sz="2400" b="0" dirty="0" err="1">
-                <a:solidFill>
-                  <a:schemeClr val="tx2"/>
-                </a:solidFill>
-              </a:rPr>
-              <a:t>suất</a:t>
-            </a:r>
-            <a:r>
-              <a:rPr lang="en-US" sz="2400" b="0" dirty="0">
-                <a:solidFill>
-                  <a:schemeClr val="tx2"/>
-                </a:solidFill>
-              </a:rPr>
-              <a:t> </a:t>
-            </a:r>
-            <a:r>
-              <a:rPr lang="en-US" sz="2400" b="0" dirty="0" err="1">
-                <a:solidFill>
-                  <a:schemeClr val="tx2"/>
-                </a:solidFill>
-              </a:rPr>
-              <a:t>để</a:t>
-            </a:r>
-            <a:r>
-              <a:rPr lang="en-US" sz="2400" b="0" dirty="0">
-                <a:solidFill>
-                  <a:schemeClr val="tx2"/>
-                </a:solidFill>
-              </a:rPr>
-              <a:t> </a:t>
-            </a:r>
-            <a:r>
-              <a:rPr lang="en-US" sz="2400" b="0" dirty="0" err="1">
-                <a:solidFill>
-                  <a:schemeClr val="tx2"/>
-                </a:solidFill>
-              </a:rPr>
-              <a:t>định</a:t>
-            </a:r>
-            <a:r>
-              <a:rPr lang="en-US" sz="2400" b="0" dirty="0">
-                <a:solidFill>
-                  <a:schemeClr val="tx2"/>
-                </a:solidFill>
-              </a:rPr>
-              <a:t> </a:t>
-            </a:r>
-            <a:r>
-              <a:rPr lang="en-US" sz="2400" b="0" dirty="0" err="1">
-                <a:solidFill>
-                  <a:schemeClr val="tx2"/>
-                </a:solidFill>
-              </a:rPr>
-              <a:t>lượng</a:t>
-            </a:r>
-            <a:r>
-              <a:rPr lang="en-US" sz="2400" b="0" dirty="0">
-                <a:solidFill>
-                  <a:schemeClr val="tx2"/>
-                </a:solidFill>
-              </a:rPr>
-              <a:t> </a:t>
-            </a:r>
-            <a:r>
-              <a:rPr lang="en-US" sz="2400" b="0" dirty="0" err="1">
-                <a:solidFill>
-                  <a:schemeClr val="tx2"/>
-                </a:solidFill>
-              </a:rPr>
-              <a:t>sự</a:t>
-            </a:r>
-            <a:r>
-              <a:rPr lang="en-US" sz="2400" b="0" dirty="0">
-                <a:solidFill>
-                  <a:schemeClr val="tx2"/>
-                </a:solidFill>
-              </a:rPr>
-              <a:t> </a:t>
-            </a:r>
-            <a:r>
-              <a:rPr lang="en-US" sz="2400" b="0" dirty="0" err="1">
-                <a:solidFill>
-                  <a:schemeClr val="tx2"/>
-                </a:solidFill>
-              </a:rPr>
-              <a:t>không</a:t>
-            </a:r>
-            <a:r>
-              <a:rPr lang="en-US" sz="2400" b="0" dirty="0">
-                <a:solidFill>
-                  <a:schemeClr val="tx2"/>
-                </a:solidFill>
-              </a:rPr>
-              <a:t> </a:t>
-            </a:r>
-            <a:r>
-              <a:rPr lang="en-US" sz="2400" b="0" dirty="0" err="1">
-                <a:solidFill>
-                  <a:schemeClr val="tx2"/>
-                </a:solidFill>
-              </a:rPr>
-              <a:t>chắc</a:t>
-            </a:r>
-            <a:r>
-              <a:rPr lang="en-US" sz="2400" b="0" dirty="0">
-                <a:solidFill>
-                  <a:schemeClr val="tx2"/>
-                </a:solidFill>
-              </a:rPr>
-              <a:t> </a:t>
-            </a:r>
-            <a:r>
-              <a:rPr lang="en-US" sz="2400" b="0" dirty="0" err="1">
-                <a:solidFill>
-                  <a:schemeClr val="tx2"/>
-                </a:solidFill>
-              </a:rPr>
-              <a:t>chắn</a:t>
-            </a:r>
-            <a:r>
-              <a:rPr lang="en-US" sz="2400" b="0" dirty="0">
-                <a:solidFill>
-                  <a:schemeClr val="tx2"/>
-                </a:solidFill>
-              </a:rPr>
-              <a:t> </a:t>
-            </a:r>
-            <a:r>
-              <a:rPr lang="en-US" sz="2400" b="0" dirty="0" err="1">
+              <a:t>xác suất </a:t>
+            </a:r>
+            <a:r>
+              <a:rPr lang="en-US" sz="2000" b="0" dirty="0" err="1" smtClean="0">
                 <a:solidFill>
                   <a:schemeClr val="tx2"/>
                 </a:solidFill>
@@ -32001,46 +31923,14 @@
               <a:t>trong</a:t>
             </a:r>
             <a:r>
-              <a:rPr lang="en-US" sz="2400" b="0" dirty="0">
+              <a:rPr lang="vi-VN" sz="2000" b="0" dirty="0" smtClean="0">
                 <a:solidFill>
                   <a:schemeClr val="tx2"/>
                 </a:solidFill>
               </a:rPr>
-              <a:t> </a:t>
-            </a:r>
-            <a:r>
-              <a:rPr lang="en-US" sz="2400" b="0" dirty="0" err="1">
-                <a:solidFill>
-                  <a:schemeClr val="tx2"/>
-                </a:solidFill>
-              </a:rPr>
-              <a:t>tìm</a:t>
-            </a:r>
-            <a:r>
-              <a:rPr lang="en-US" sz="2400" b="0" dirty="0">
-                <a:solidFill>
-                  <a:schemeClr val="tx2"/>
-                </a:solidFill>
-              </a:rPr>
-              <a:t> </a:t>
-            </a:r>
-            <a:r>
-              <a:rPr lang="en-US" sz="2400" b="0" dirty="0" err="1">
-                <a:solidFill>
-                  <a:schemeClr val="tx2"/>
-                </a:solidFill>
-              </a:rPr>
-              <a:t>kiếm</a:t>
-            </a:r>
-            <a:r>
-              <a:rPr lang="en-US" sz="2400" b="0" dirty="0" smtClean="0">
-                <a:solidFill>
-                  <a:schemeClr val="tx2"/>
-                </a:solidFill>
-              </a:rPr>
-              <a:t>.</a:t>
-            </a:r>
-            <a:endParaRPr lang="vi-VN" sz="2400" b="0" dirty="0">
+              <a:t> tìm kiếm thông tin.</a:t>
+            </a:r>
+            <a:endParaRPr lang="vi-VN" sz="2000" b="0" dirty="0">
               <a:solidFill>
                 <a:schemeClr val="tx2"/>
               </a:solidFill>
@@ -33805,7 +33695,7 @@
           <a:graphicData uri="http://schemas.openxmlformats.org/presentationml/2006/ole">
             <mc:AlternateContent xmlns:mc="http://schemas.openxmlformats.org/markup-compatibility/2006">
               <mc:Choice xmlns:v="urn:schemas-microsoft-com:vml" Requires="v">
-                <p:oleObj spid="_x0000_s36116" name="Формула" r:id="rId3" imgW="4025900" imgH="1066800" progId="Equation.3">
+                <p:oleObj spid="_x0000_s36204" name="Формула" r:id="rId3" imgW="4025900" imgH="1066800" progId="Equation.3">
                   <p:embed/>
                 </p:oleObj>
               </mc:Choice>
@@ -34132,7 +34022,7 @@
           <a:graphicData uri="http://schemas.openxmlformats.org/presentationml/2006/ole">
             <mc:AlternateContent xmlns:mc="http://schemas.openxmlformats.org/markup-compatibility/2006">
               <mc:Choice xmlns:v="urn:schemas-microsoft-com:vml" Requires="v">
-                <p:oleObj spid="_x0000_s36117" name="Формула" r:id="rId5" imgW="3314700" imgH="1016000" progId="Equation.3">
+                <p:oleObj spid="_x0000_s36205" name="Формула" r:id="rId5" imgW="3314700" imgH="1016000" progId="Equation.3">
                   <p:embed/>
                 </p:oleObj>
               </mc:Choice>
@@ -35012,7 +34902,7 @@
           <a:graphicData uri="http://schemas.openxmlformats.org/presentationml/2006/ole">
             <mc:AlternateContent xmlns:mc="http://schemas.openxmlformats.org/markup-compatibility/2006">
               <mc:Choice xmlns:v="urn:schemas-microsoft-com:vml" Requires="v">
-                <p:oleObj spid="_x0000_s37139" name="Формула" r:id="rId3" imgW="3949700" imgH="482600" progId="Equation.3">
+                <p:oleObj spid="_x0000_s37227" name="Формула" r:id="rId3" imgW="3949700" imgH="482600" progId="Equation.3">
                   <p:embed/>
                 </p:oleObj>
               </mc:Choice>
@@ -35693,7 +35583,7 @@
             <a:graphicData uri="http://schemas.openxmlformats.org/presentationml/2006/ole">
               <mc:AlternateContent xmlns:mc="http://schemas.openxmlformats.org/markup-compatibility/2006">
                 <mc:Choice xmlns:v="urn:schemas-microsoft-com:vml" Requires="v">
-                  <p:oleObj spid="_x0000_s37140" name="Формула" r:id="rId5" imgW="2451100" imgH="457200" progId="Equation.3">
+                  <p:oleObj spid="_x0000_s37228" name="Формула" r:id="rId5" imgW="2451100" imgH="457200" progId="Equation.3">
                     <p:embed/>
                   </p:oleObj>
                 </mc:Choice>
@@ -36389,7 +36279,7 @@
           <a:graphicData uri="http://schemas.openxmlformats.org/presentationml/2006/ole">
             <mc:AlternateContent xmlns:mc="http://schemas.openxmlformats.org/markup-compatibility/2006">
               <mc:Choice xmlns:v="urn:schemas-microsoft-com:vml" Requires="v">
-                <p:oleObj spid="_x0000_s38025" name="Формула" r:id="rId3" imgW="3314700" imgH="1016000" progId="Equation.3">
+                <p:oleObj spid="_x0000_s38069" name="Формула" r:id="rId3" imgW="3314700" imgH="1016000" progId="Equation.3">
                   <p:embed/>
                 </p:oleObj>
               </mc:Choice>
@@ -36872,7 +36762,7 @@
           <a:graphicData uri="http://schemas.openxmlformats.org/presentationml/2006/ole">
             <mc:AlternateContent xmlns:mc="http://schemas.openxmlformats.org/markup-compatibility/2006">
               <mc:Choice xmlns:v="urn:schemas-microsoft-com:vml" Requires="v">
-                <p:oleObj spid="_x0000_s39050" name="Формула" r:id="rId3" imgW="3949700" imgH="482600" progId="Equation.3">
+                <p:oleObj spid="_x0000_s39094" name="Формула" r:id="rId3" imgW="3949700" imgH="482600" progId="Equation.3">
                   <p:embed/>
                 </p:oleObj>
               </mc:Choice>
@@ -37406,7 +37296,7 @@
           <a:graphicData uri="http://schemas.openxmlformats.org/presentationml/2006/ole">
             <mc:AlternateContent xmlns:mc="http://schemas.openxmlformats.org/markup-compatibility/2006">
               <mc:Choice xmlns:v="urn:schemas-microsoft-com:vml" Requires="v">
-                <p:oleObj spid="_x0000_s40074" name="Формула" r:id="rId3" imgW="3314700" imgH="1016000" progId="Equation.3">
+                <p:oleObj spid="_x0000_s40118" name="Формула" r:id="rId3" imgW="3314700" imgH="1016000" progId="Equation.3">
                   <p:embed/>
                 </p:oleObj>
               </mc:Choice>
@@ -37576,11 +37466,7 @@
             <a:pPr eaLnBrk="1" hangingPunct="1"/>
             <a:r>
               <a:rPr lang="vi-VN" sz="3600" smtClean="0"/>
-              <a:t>Bài </a:t>
-            </a:r>
-            <a:r>
-              <a:rPr lang="vi-VN" sz="3600" smtClean="0"/>
-              <a:t>tập 5.1</a:t>
+              <a:t>Bài tập 5.1</a:t>
             </a:r>
             <a:endParaRPr lang="vi-VN" sz="3600" dirty="0" smtClean="0"/>
           </a:p>
@@ -38497,8 +38383,8 @@
         </p:nvSpPr>
         <p:spPr bwMode="auto">
           <a:xfrm>
-            <a:off x="539552" y="2132856"/>
-            <a:ext cx="8399462" cy="4344144"/>
+            <a:off x="611560" y="1988840"/>
+            <a:ext cx="8327454" cy="4488160"/>
           </a:xfrm>
           <a:prstGeom prst="rect">
             <a:avLst/>
@@ -38730,51 +38616,162 @@
           <a:p>
             <a:pPr algn="just" eaLnBrk="1" hangingPunct="1"/>
             <a:r>
-              <a:rPr lang="vi-VN" sz="2000" b="0" dirty="0"/>
-              <a:t>Cho một nhu cầu thông tin người dùng </a:t>
-            </a:r>
-            <a:r>
-              <a:rPr lang="vi-VN" sz="2000" b="0" dirty="0" smtClean="0"/>
-              <a:t>(được biểu </a:t>
-            </a:r>
-            <a:r>
-              <a:rPr lang="vi-VN" sz="2000" b="0" dirty="0"/>
-              <a:t>diễn dưới dạng truy vấn) và một bộ dữ liệu văn bản </a:t>
-            </a:r>
-            <a:r>
-              <a:rPr lang="vi-VN" sz="2000" b="0" dirty="0" smtClean="0"/>
-              <a:t>(được biểu diễn dưới dạng mô </a:t>
-            </a:r>
-            <a:r>
-              <a:rPr lang="vi-VN" sz="2000" b="0" dirty="0"/>
-              <a:t>hình </a:t>
-            </a:r>
-            <a:r>
-              <a:rPr lang="vi-VN" sz="2000" b="0" dirty="0" smtClean="0"/>
-              <a:t>văn bản), </a:t>
-            </a:r>
-            <a:r>
-              <a:rPr lang="vi-VN" sz="2000" b="0" dirty="0"/>
-              <a:t>hệ thống phải xác định </a:t>
-            </a:r>
-            <a:r>
-              <a:rPr lang="vi-VN" sz="2000" b="0" dirty="0" smtClean="0"/>
-              <a:t>liệu văn </a:t>
-            </a:r>
-            <a:r>
-              <a:rPr lang="vi-VN" sz="2000" b="0" dirty="0"/>
-              <a:t>bản </a:t>
-            </a:r>
-            <a:r>
-              <a:rPr lang="vi-VN" sz="2000" b="0" dirty="0" smtClean="0"/>
-              <a:t>có đáp ứng nhu cầu thông tin hay không;</a:t>
+              <a:rPr lang="en-US" sz="2000" b="0" dirty="0" err="1" smtClean="0"/>
+              <a:t>Bài</a:t>
+            </a:r>
+            <a:r>
+              <a:rPr lang="en-US" sz="2000" b="0" dirty="0" smtClean="0"/>
+              <a:t> </a:t>
+            </a:r>
+            <a:r>
+              <a:rPr lang="en-US" sz="2000" b="0" dirty="0" err="1" smtClean="0"/>
+              <a:t>toán</a:t>
+            </a:r>
+            <a:r>
+              <a:rPr lang="en-US" sz="2000" b="0" dirty="0" smtClean="0"/>
+              <a:t> </a:t>
+            </a:r>
+            <a:r>
+              <a:rPr lang="en-US" sz="2000" b="0" dirty="0" err="1" smtClean="0"/>
+              <a:t>tìm</a:t>
+            </a:r>
+            <a:r>
+              <a:rPr lang="en-US" sz="2000" b="0" dirty="0" smtClean="0"/>
+              <a:t> </a:t>
+            </a:r>
+            <a:r>
+              <a:rPr lang="en-US" sz="2000" b="0" dirty="0" err="1" smtClean="0"/>
+              <a:t>kiếm</a:t>
+            </a:r>
+            <a:r>
+              <a:rPr lang="en-US" sz="2000" b="0" dirty="0" smtClean="0"/>
+              <a:t> </a:t>
+            </a:r>
+            <a:r>
+              <a:rPr lang="en-US" sz="2000" b="0" dirty="0" err="1" smtClean="0"/>
+              <a:t>thông</a:t>
+            </a:r>
+            <a:r>
+              <a:rPr lang="en-US" sz="2000" b="0" dirty="0" smtClean="0"/>
+              <a:t> tin:</a:t>
             </a:r>
           </a:p>
           <a:p>
             <a:pPr lvl="1" algn="just" eaLnBrk="1" hangingPunct="1"/>
             <a:r>
+              <a:rPr lang="vi-VN" sz="1600" b="0" dirty="0" smtClean="0"/>
+              <a:t>Cho </a:t>
+            </a:r>
+            <a:r>
+              <a:rPr lang="vi-VN" sz="1600" b="0" dirty="0"/>
+              <a:t>một </a:t>
+            </a:r>
+            <a:r>
+              <a:rPr lang="vi-VN" sz="1600" b="0" dirty="0" smtClean="0"/>
+              <a:t>c</a:t>
+            </a:r>
+            <a:r>
+              <a:rPr lang="en-US" sz="1600" b="0" dirty="0" err="1" smtClean="0"/>
+              <a:t>âu</a:t>
+            </a:r>
+            <a:r>
+              <a:rPr lang="vi-VN" sz="1600" b="0" dirty="0" smtClean="0"/>
+              <a:t> truy vấn </a:t>
+            </a:r>
+            <a:r>
+              <a:rPr lang="vi-VN" sz="1600" b="0" dirty="0"/>
+              <a:t>và </a:t>
+            </a:r>
+            <a:r>
+              <a:rPr lang="vi-VN" sz="1600" b="0" dirty="0" smtClean="0"/>
+              <a:t>một</a:t>
+            </a:r>
+            <a:r>
+              <a:rPr lang="en-US" sz="1600" b="0" dirty="0" smtClean="0"/>
+              <a:t> </a:t>
+            </a:r>
+            <a:r>
+              <a:rPr lang="en-US" sz="1600" b="0" dirty="0" err="1" smtClean="0"/>
+              <a:t>biểu</a:t>
+            </a:r>
+            <a:r>
+              <a:rPr lang="en-US" sz="1600" b="0" dirty="0" smtClean="0"/>
+              <a:t> </a:t>
+            </a:r>
+            <a:r>
+              <a:rPr lang="en-US" sz="1600" b="0" dirty="0" err="1" smtClean="0"/>
+              <a:t>diễn</a:t>
+            </a:r>
+            <a:r>
+              <a:rPr lang="en-US" sz="1600" b="0" dirty="0" smtClean="0"/>
+              <a:t> </a:t>
+            </a:r>
+            <a:r>
+              <a:rPr lang="en-US" sz="1600" b="0" dirty="0" err="1" smtClean="0"/>
+              <a:t>của</a:t>
+            </a:r>
+            <a:r>
+              <a:rPr lang="vi-VN" sz="1600" b="0" dirty="0" smtClean="0"/>
+              <a:t> </a:t>
+            </a:r>
+            <a:r>
+              <a:rPr lang="vi-VN" sz="1600" b="0" dirty="0"/>
+              <a:t>bộ dữ liệu văn </a:t>
+            </a:r>
+            <a:r>
+              <a:rPr lang="vi-VN" sz="1600" b="0" dirty="0" smtClean="0"/>
+              <a:t>bản, </a:t>
+            </a:r>
+            <a:r>
+              <a:rPr lang="vi-VN" sz="1600" b="0" dirty="0"/>
+              <a:t>hệ thống phải xác định </a:t>
+            </a:r>
+            <a:r>
+              <a:rPr lang="vi-VN" sz="1600" b="0" dirty="0" smtClean="0"/>
+              <a:t>liệu văn </a:t>
+            </a:r>
+            <a:r>
+              <a:rPr lang="vi-VN" sz="1600" b="0" dirty="0"/>
+              <a:t>bản </a:t>
+            </a:r>
+            <a:r>
+              <a:rPr lang="vi-VN" sz="1600" b="0" dirty="0" smtClean="0"/>
+              <a:t>có đáp ứng nhu cầu thông tin hay không;</a:t>
+            </a:r>
+          </a:p>
+          <a:p>
+            <a:pPr lvl="1" algn="just" eaLnBrk="1" hangingPunct="1"/>
+            <a:r>
               <a:rPr lang="vi-VN" sz="1800" b="0" dirty="0"/>
-              <a:t>Mô hình Boolean lựa chọn những văn bản thỏa mãn biểu thức truy vấn; mô hình không gian vec-tơ sử dụng độ tương đồng cosine</a:t>
+              <a:t>Mô hình Boolean lựa chọn những văn bản thỏa mãn biểu thức truy vấn; mô hình không gian vec-tơ </a:t>
+            </a:r>
+            <a:r>
+              <a:rPr lang="en-US" sz="1800" b="0" dirty="0" err="1" smtClean="0"/>
+              <a:t>xếp</a:t>
+            </a:r>
+            <a:r>
+              <a:rPr lang="en-US" sz="1800" b="0" dirty="0" smtClean="0"/>
+              <a:t> </a:t>
+            </a:r>
+            <a:r>
+              <a:rPr lang="en-US" sz="1800" b="0" dirty="0" err="1" smtClean="0"/>
+              <a:t>hạng</a:t>
+            </a:r>
+            <a:r>
+              <a:rPr lang="en-US" sz="1800" b="0" dirty="0" smtClean="0"/>
+              <a:t> </a:t>
+            </a:r>
+            <a:r>
+              <a:rPr lang="en-US" sz="1800" b="0" dirty="0" err="1" smtClean="0"/>
+              <a:t>theo</a:t>
+            </a:r>
+            <a:r>
+              <a:rPr lang="vi-VN" sz="1800" b="0" dirty="0" smtClean="0"/>
+              <a:t> </a:t>
+            </a:r>
+            <a:r>
+              <a:rPr lang="vi-VN" sz="1800" b="0" dirty="0"/>
+              <a:t>độ tương đồng cosine</a:t>
             </a:r>
             <a:r>
               <a:rPr lang="vi-VN" sz="1800" b="0" dirty="0" smtClean="0"/>
@@ -38798,16 +38795,193 @@
             <a:pPr algn="just" eaLnBrk="1" hangingPunct="1"/>
             <a:r>
               <a:rPr lang="vi-VN" sz="2000" b="0" dirty="0"/>
-              <a:t>Lý thuyết xác suất là nền tảng suy diễn trong điều kiện không chắc chắn. Các mô hình xác suất sử dụng nền tảng này để đánh giá khả năng văn bản phù hợp với truy </a:t>
+              <a:t>Lý thuyết xác suất là nền tảng suy diễn trong điều kiện không chắc </a:t>
             </a:r>
             <a:r>
               <a:rPr lang="vi-VN" sz="2000" b="0" dirty="0" smtClean="0"/>
-              <a:t>vấn</a:t>
+              <a:t>chắn</a:t>
+            </a:r>
+            <a:r>
+              <a:rPr lang="en-US" sz="2000" b="0" dirty="0" smtClean="0"/>
+              <a:t> </a:t>
+            </a:r>
+            <a:r>
+              <a:rPr lang="en-US" sz="2000" b="0" dirty="0" err="1" smtClean="0"/>
+              <a:t>nói</a:t>
+            </a:r>
+            <a:r>
+              <a:rPr lang="en-US" sz="2000" b="0" dirty="0" smtClean="0"/>
+              <a:t> </a:t>
+            </a:r>
+            <a:r>
+              <a:rPr lang="en-US" sz="2000" b="0" dirty="0" err="1" smtClean="0"/>
+              <a:t>chung</a:t>
+            </a:r>
+            <a:r>
+              <a:rPr lang="en-US" sz="2000" b="0" dirty="0" smtClean="0"/>
+              <a:t>, </a:t>
+            </a:r>
+            <a:r>
+              <a:rPr lang="en-US" sz="2000" b="0" dirty="0" err="1" smtClean="0"/>
+              <a:t>và</a:t>
+            </a:r>
+            <a:r>
+              <a:rPr lang="en-US" sz="2000" b="0" dirty="0" smtClean="0"/>
+              <a:t> </a:t>
+            </a:r>
+            <a:r>
+              <a:rPr lang="en-US" sz="2000" b="0" dirty="0" err="1" smtClean="0"/>
+              <a:t>đưa</a:t>
+            </a:r>
+            <a:r>
+              <a:rPr lang="en-US" sz="2000" b="0" dirty="0" smtClean="0"/>
+              <a:t> </a:t>
+            </a:r>
+            <a:r>
+              <a:rPr lang="en-US" sz="2000" b="0" dirty="0" err="1" smtClean="0"/>
+              <a:t>ra</a:t>
+            </a:r>
+            <a:r>
+              <a:rPr lang="en-US" sz="2000" b="0" dirty="0" smtClean="0"/>
+              <a:t> </a:t>
+            </a:r>
+            <a:r>
+              <a:rPr lang="en-US" sz="2000" b="0" dirty="0" err="1" smtClean="0"/>
+              <a:t>quyết</a:t>
+            </a:r>
+            <a:r>
+              <a:rPr lang="en-US" sz="2000" b="0" dirty="0" smtClean="0"/>
+              <a:t> </a:t>
+            </a:r>
+            <a:r>
+              <a:rPr lang="en-US" sz="2000" b="0" dirty="0" err="1" smtClean="0"/>
+              <a:t>định</a:t>
+            </a:r>
+            <a:r>
+              <a:rPr lang="en-US" sz="2000" b="0" dirty="0" smtClean="0"/>
+              <a:t> </a:t>
+            </a:r>
+            <a:r>
+              <a:rPr lang="en-US" sz="2000" b="0" dirty="0" err="1" smtClean="0"/>
+              <a:t>văn</a:t>
+            </a:r>
+            <a:r>
+              <a:rPr lang="en-US" sz="2000" b="0" dirty="0" smtClean="0"/>
+              <a:t> </a:t>
+            </a:r>
+            <a:r>
+              <a:rPr lang="en-US" sz="2000" b="0" dirty="0" err="1" smtClean="0"/>
+              <a:t>bả</a:t>
+            </a:r>
+            <a:r>
+              <a:rPr lang="en-US" sz="2000" b="0" dirty="0" err="1" smtClean="0"/>
+              <a:t>n</a:t>
+            </a:r>
+            <a:r>
+              <a:rPr lang="en-US" sz="2000" b="0" dirty="0" smtClean="0"/>
+              <a:t> </a:t>
+            </a:r>
+            <a:r>
+              <a:rPr lang="en-US" sz="2000" b="0" dirty="0" err="1" smtClean="0"/>
+              <a:t>là</a:t>
+            </a:r>
+            <a:r>
+              <a:rPr lang="en-US" sz="2000" b="0" dirty="0" smtClean="0"/>
+              <a:t> </a:t>
+            </a:r>
+            <a:r>
+              <a:rPr lang="en-US" sz="2000" b="0" dirty="0" err="1" smtClean="0"/>
+              <a:t>văn</a:t>
+            </a:r>
+            <a:r>
+              <a:rPr lang="en-US" sz="2000" b="0" dirty="0" smtClean="0"/>
+              <a:t> </a:t>
+            </a:r>
+            <a:r>
+              <a:rPr lang="en-US" sz="2000" b="0" dirty="0" err="1" smtClean="0"/>
+              <a:t>bản</a:t>
+            </a:r>
+            <a:r>
+              <a:rPr lang="en-US" sz="2000" b="0" dirty="0" smtClean="0"/>
+              <a:t> </a:t>
+            </a:r>
+            <a:r>
+              <a:rPr lang="en-US" sz="2000" b="0" dirty="0" err="1" smtClean="0"/>
+              <a:t>phù</a:t>
+            </a:r>
+            <a:r>
+              <a:rPr lang="en-US" sz="2000" b="0" dirty="0" smtClean="0"/>
+              <a:t> </a:t>
+            </a:r>
+            <a:r>
+              <a:rPr lang="en-US" sz="2000" b="0" dirty="0" err="1" smtClean="0"/>
+              <a:t>hợp</a:t>
+            </a:r>
+            <a:r>
+              <a:rPr lang="en-US" sz="2000" b="0" dirty="0" smtClean="0"/>
+              <a:t> </a:t>
+            </a:r>
+            <a:r>
+              <a:rPr lang="en-US" sz="2000" b="0" dirty="0" err="1" smtClean="0"/>
+              <a:t>trong</a:t>
+            </a:r>
+            <a:r>
+              <a:rPr lang="en-US" sz="2000" b="0" dirty="0" smtClean="0"/>
+              <a:t> </a:t>
+            </a:r>
+            <a:r>
+              <a:rPr lang="en-US" sz="2000" b="0" dirty="0" err="1" smtClean="0"/>
+              <a:t>các</a:t>
+            </a:r>
+            <a:r>
+              <a:rPr lang="vi-VN" sz="2000" b="0" dirty="0" smtClean="0"/>
+              <a:t> </a:t>
             </a:r>
             <a:r>
               <a:rPr lang="vi-VN" sz="2000" b="0" dirty="0"/>
+              <a:t>mô hình </a:t>
+            </a:r>
+            <a:r>
+              <a:rPr lang="en-US" sz="2000" b="0" dirty="0" err="1" smtClean="0"/>
+              <a:t>dựa</a:t>
+            </a:r>
+            <a:r>
+              <a:rPr lang="en-US" sz="2000" b="0" dirty="0" smtClean="0"/>
+              <a:t> </a:t>
+            </a:r>
+            <a:r>
+              <a:rPr lang="en-US" sz="2000" b="0" dirty="0" err="1" smtClean="0"/>
+              <a:t>trên</a:t>
+            </a:r>
+            <a:r>
+              <a:rPr lang="en-US" sz="2000" b="0" dirty="0" smtClean="0"/>
+              <a:t> </a:t>
+            </a:r>
+            <a:r>
+              <a:rPr lang="vi-VN" sz="2000" b="0" dirty="0" smtClean="0"/>
+              <a:t>xác </a:t>
+            </a:r>
+            <a:r>
+              <a:rPr lang="vi-VN" sz="2000" b="0" dirty="0"/>
+              <a:t>suất </a:t>
+            </a:r>
+            <a:r>
+              <a:rPr lang="en-US" sz="2000" b="0" dirty="0" err="1" smtClean="0"/>
+              <a:t>nói</a:t>
+            </a:r>
+            <a:r>
+              <a:rPr lang="en-US" sz="2000" b="0" dirty="0" smtClean="0"/>
+              <a:t> </a:t>
+            </a:r>
+            <a:r>
+              <a:rPr lang="en-US" sz="2000" b="0" dirty="0" err="1" smtClean="0"/>
+              <a:t>riêng</a:t>
+            </a:r>
+            <a:r>
+              <a:rPr lang="vi-VN" sz="2000" b="0" dirty="0" smtClean="0"/>
               <a:t>.</a:t>
             </a:r>
+            <a:endParaRPr lang="vi-VN" sz="2000" b="0" dirty="0"/>
           </a:p>
         </p:txBody>
       </p:sp>
@@ -39222,8 +39396,8 @@
         </p:nvSpPr>
         <p:spPr bwMode="auto">
           <a:xfrm>
-            <a:off x="861814" y="2132856"/>
-            <a:ext cx="8077200" cy="4344144"/>
+            <a:off x="611560" y="1988840"/>
+            <a:ext cx="8327454" cy="4488160"/>
           </a:xfrm>
           <a:prstGeom prst="rect">
             <a:avLst/>
@@ -39505,14 +39679,102 @@
               <a:buNone/>
             </a:pPr>
             <a:r>
-              <a:rPr lang="vi-VN" sz="2400" b="0" dirty="0" smtClean="0">
+              <a:rPr lang="vi-VN" sz="2000" b="0" dirty="0" smtClean="0">
                 <a:solidFill>
                   <a:schemeClr val="tx2"/>
                 </a:solidFill>
               </a:rPr>
-              <a:t>Phương pháp xác suất là một trong những phương pháp ra đời sớm nhất nhưng vẫn là đề tài nóng trong tìm kiếm thông tin hiện đại.</a:t>
-            </a:r>
-            <a:endParaRPr lang="vi-VN" sz="2400" b="0" dirty="0">
+              <a:t>Phương pháp xác suất là một trong những phương pháp </a:t>
+            </a:r>
+            <a:r>
+              <a:rPr lang="en-US" sz="2000" b="0" dirty="0" err="1" smtClean="0">
+                <a:solidFill>
+                  <a:schemeClr val="tx2"/>
+                </a:solidFill>
+              </a:rPr>
+              <a:t>đã</a:t>
+            </a:r>
+            <a:r>
+              <a:rPr lang="en-US" sz="2000" b="0" dirty="0" smtClean="0">
+                <a:solidFill>
+                  <a:schemeClr val="tx2"/>
+                </a:solidFill>
+              </a:rPr>
+              <a:t> </a:t>
+            </a:r>
+            <a:r>
+              <a:rPr lang="en-US" sz="2000" b="0" dirty="0" err="1" smtClean="0">
+                <a:solidFill>
+                  <a:schemeClr val="tx2"/>
+                </a:solidFill>
+              </a:rPr>
+              <a:t>tồn</a:t>
+            </a:r>
+            <a:r>
+              <a:rPr lang="en-US" sz="2000" b="0" dirty="0" smtClean="0">
+                <a:solidFill>
+                  <a:schemeClr val="tx2"/>
+                </a:solidFill>
+              </a:rPr>
+              <a:t> </a:t>
+            </a:r>
+            <a:r>
+              <a:rPr lang="en-US" sz="2000" b="0" dirty="0" err="1" smtClean="0">
+                <a:solidFill>
+                  <a:schemeClr val="tx2"/>
+                </a:solidFill>
+              </a:rPr>
+              <a:t>tại</a:t>
+            </a:r>
+            <a:r>
+              <a:rPr lang="en-US" sz="2000" b="0" dirty="0" smtClean="0">
+                <a:solidFill>
+                  <a:schemeClr val="tx2"/>
+                </a:solidFill>
+              </a:rPr>
+              <a:t> </a:t>
+            </a:r>
+            <a:r>
+              <a:rPr lang="en-US" sz="2000" b="0" dirty="0" err="1" smtClean="0">
+                <a:solidFill>
+                  <a:schemeClr val="tx2"/>
+                </a:solidFill>
+              </a:rPr>
+              <a:t>từ</a:t>
+            </a:r>
+            <a:r>
+              <a:rPr lang="en-US" sz="2000" b="0" dirty="0" smtClean="0">
+                <a:solidFill>
+                  <a:schemeClr val="tx2"/>
+                </a:solidFill>
+              </a:rPr>
+              <a:t> </a:t>
+            </a:r>
+            <a:r>
+              <a:rPr lang="en-US" sz="2000" b="0" dirty="0" err="1" smtClean="0">
+                <a:solidFill>
+                  <a:schemeClr val="tx2"/>
+                </a:solidFill>
+              </a:rPr>
+              <a:t>lâu</a:t>
+            </a:r>
+            <a:r>
+              <a:rPr lang="vi-VN" sz="2000" b="0" dirty="0" smtClean="0">
+                <a:solidFill>
+                  <a:schemeClr val="tx2"/>
+                </a:solidFill>
+              </a:rPr>
+              <a:t> </a:t>
+            </a:r>
+            <a:r>
+              <a:rPr lang="vi-VN" sz="2000" b="0" dirty="0" smtClean="0">
+                <a:solidFill>
+                  <a:schemeClr val="tx2"/>
+                </a:solidFill>
+              </a:rPr>
+              <a:t>nhưng vẫn là đề tài nóng trong tìm kiếm thông tin hiện đại.</a:t>
+            </a:r>
+            <a:endParaRPr lang="vi-VN" sz="2000" b="0" dirty="0">
               <a:solidFill>
                 <a:schemeClr val="tx2"/>
               </a:solidFill>
@@ -39596,23 +39858,7 @@
             <a:pPr eaLnBrk="1" hangingPunct="1"/>
             <a:r>
               <a:rPr lang="en-US" sz="3600" dirty="0" err="1" smtClean="0"/>
-              <a:t>Vấn</a:t>
-            </a:r>
-            <a:r>
-              <a:rPr lang="en-US" sz="3600" dirty="0" smtClean="0"/>
-              <a:t> </a:t>
-            </a:r>
-            <a:r>
-              <a:rPr lang="en-US" sz="3600" dirty="0" err="1" smtClean="0"/>
-              <a:t>đề</a:t>
-            </a:r>
-            <a:r>
-              <a:rPr lang="en-US" sz="3600" dirty="0" smtClean="0"/>
-              <a:t> </a:t>
-            </a:r>
-            <a:r>
-              <a:rPr lang="en-US" sz="3600" dirty="0" err="1" smtClean="0"/>
-              <a:t>xếp</a:t>
+              <a:t>Xếp</a:t>
             </a:r>
             <a:r>
               <a:rPr lang="en-US" sz="3600" dirty="0" smtClean="0"/>
@@ -39621,14 +39867,6 @@
             <a:r>
               <a:rPr lang="en-US" sz="3600" dirty="0" err="1" smtClean="0"/>
               <a:t>hạng</a:t>
-            </a:r>
-            <a:r>
-              <a:rPr lang="en-US" sz="3600" dirty="0" smtClean="0"/>
-              <a:t> </a:t>
-            </a:r>
-            <a:r>
-              <a:rPr lang="en-US" sz="3600" dirty="0" err="1" smtClean="0"/>
-              <a:t>theo</a:t>
             </a:r>
             <a:r>
               <a:rPr lang="en-US" sz="3600" dirty="0" smtClean="0"/>
@@ -39670,144 +39908,6 @@
           <a:bodyPr/>
           <a:lstStyle/>
           <a:p>
-            <a:pPr eaLnBrk="1" hangingPunct="1">
-              <a:defRPr/>
-            </a:pPr>
-            <a:r>
-              <a:rPr lang="en-US" sz="2400" dirty="0" err="1" smtClean="0"/>
-              <a:t>Tìm</a:t>
-            </a:r>
-            <a:r>
-              <a:rPr lang="en-US" sz="2400" dirty="0" smtClean="0"/>
-              <a:t> </a:t>
-            </a:r>
-            <a:r>
-              <a:rPr lang="en-US" sz="2400" dirty="0" err="1" smtClean="0"/>
-              <a:t>kiếm</a:t>
-            </a:r>
-            <a:r>
-              <a:rPr lang="en-US" sz="2400" dirty="0" smtClean="0"/>
-              <a:t> </a:t>
-            </a:r>
-            <a:r>
-              <a:rPr lang="en-US" sz="2400" dirty="0" err="1" smtClean="0"/>
-              <a:t>có</a:t>
-            </a:r>
-            <a:r>
-              <a:rPr lang="en-US" sz="2400" dirty="0" smtClean="0"/>
-              <a:t> </a:t>
-            </a:r>
-            <a:r>
-              <a:rPr lang="en-US" sz="2400" dirty="0" err="1" smtClean="0"/>
-              <a:t>xếp</a:t>
-            </a:r>
-            <a:r>
-              <a:rPr lang="en-US" sz="2400" dirty="0" smtClean="0"/>
-              <a:t> </a:t>
-            </a:r>
-            <a:r>
-              <a:rPr lang="en-US" sz="2400" dirty="0" err="1" smtClean="0"/>
-              <a:t>hạng</a:t>
-            </a:r>
-            <a:r>
-              <a:rPr lang="en-US" sz="2400" dirty="0" smtClean="0"/>
-              <a:t>:</a:t>
-            </a:r>
-          </a:p>
-          <a:p>
-            <a:pPr lvl="1" eaLnBrk="1" hangingPunct="1">
-              <a:defRPr/>
-            </a:pPr>
-            <a:r>
-              <a:rPr lang="en-US" sz="2000" dirty="0" err="1" smtClean="0"/>
-              <a:t>Kết</a:t>
-            </a:r>
-            <a:r>
-              <a:rPr lang="en-US" sz="2000" dirty="0" smtClean="0"/>
-              <a:t> </a:t>
-            </a:r>
-            <a:r>
-              <a:rPr lang="en-US" sz="2000" dirty="0" err="1" smtClean="0"/>
-              <a:t>quả</a:t>
-            </a:r>
-            <a:r>
-              <a:rPr lang="en-US" sz="2000" dirty="0" smtClean="0"/>
-              <a:t> </a:t>
-            </a:r>
-            <a:r>
-              <a:rPr lang="en-US" sz="2000" dirty="0" err="1" smtClean="0"/>
-              <a:t>được</a:t>
-            </a:r>
-            <a:r>
-              <a:rPr lang="en-US" sz="2000" dirty="0" smtClean="0"/>
-              <a:t> </a:t>
-            </a:r>
-            <a:r>
-              <a:rPr lang="en-US" sz="2000" dirty="0" err="1" smtClean="0"/>
-              <a:t>trả</a:t>
-            </a:r>
-            <a:r>
-              <a:rPr lang="en-US" sz="2000" dirty="0" smtClean="0"/>
-              <a:t> </a:t>
-            </a:r>
-            <a:r>
-              <a:rPr lang="en-US" sz="2000" dirty="0" err="1" smtClean="0"/>
-              <a:t>về</a:t>
-            </a:r>
-            <a:r>
-              <a:rPr lang="en-US" sz="2000" dirty="0" smtClean="0"/>
-              <a:t> </a:t>
-            </a:r>
-            <a:r>
-              <a:rPr lang="en-US" sz="2000" dirty="0" err="1" smtClean="0"/>
-              <a:t>dưới</a:t>
-            </a:r>
-            <a:r>
-              <a:rPr lang="en-US" sz="2000" dirty="0" smtClean="0"/>
-              <a:t> </a:t>
-            </a:r>
-            <a:r>
-              <a:rPr lang="en-US" sz="2000" dirty="0" err="1" smtClean="0"/>
-              <a:t>dạng</a:t>
-            </a:r>
-            <a:r>
-              <a:rPr lang="en-US" sz="2000" dirty="0" smtClean="0"/>
-              <a:t> </a:t>
-            </a:r>
-            <a:r>
-              <a:rPr lang="en-US" sz="2000" dirty="0" err="1" smtClean="0"/>
-              <a:t>danh</a:t>
-            </a:r>
-            <a:r>
-              <a:rPr lang="en-US" sz="2000" dirty="0" smtClean="0"/>
-              <a:t> </a:t>
-            </a:r>
-            <a:r>
-              <a:rPr lang="en-US" sz="2000" dirty="0" err="1" smtClean="0"/>
-              <a:t>sách</a:t>
-            </a:r>
-            <a:r>
-              <a:rPr lang="en-US" sz="2000" dirty="0" smtClean="0"/>
-              <a:t> </a:t>
-            </a:r>
-            <a:r>
-              <a:rPr lang="en-US" sz="2000" dirty="0" err="1" smtClean="0"/>
-              <a:t>sắp</a:t>
-            </a:r>
-            <a:r>
-              <a:rPr lang="en-US" sz="2000" dirty="0" smtClean="0"/>
-              <a:t> </a:t>
-            </a:r>
-            <a:r>
-              <a:rPr lang="en-US" sz="2000" dirty="0" err="1" smtClean="0"/>
-              <a:t>xếp</a:t>
-            </a:r>
-            <a:r>
-              <a:rPr lang="en-US" sz="2000" dirty="0" smtClean="0"/>
-              <a:t>;</a:t>
-            </a:r>
-          </a:p>
-          <a:p>
             <a:pPr algn="just" eaLnBrk="1" hangingPunct="1">
               <a:defRPr/>
             </a:pPr>
@@ -39828,8 +39928,24 @@
               <a:t> </a:t>
             </a:r>
             <a:r>
+              <a:rPr lang="en-US" sz="2400" dirty="0" smtClean="0"/>
+              <a:t>R</a:t>
+            </a:r>
+            <a:r>
+              <a:rPr lang="en-US" sz="2400" baseline="-25000" dirty="0" smtClean="0"/>
+              <a:t>d</a:t>
+            </a:r>
+            <a:r>
+              <a:rPr lang="en-US" sz="2400" baseline="-25000" dirty="0" smtClean="0"/>
+              <a:t>, q</a:t>
+            </a:r>
+            <a:r>
+              <a:rPr lang="en-US" sz="2400" dirty="0" smtClean="0"/>
+              <a:t>: </a:t>
+            </a:r>
+            <a:r>
               <a:rPr lang="en-US" sz="2400" dirty="0" err="1" smtClean="0"/>
-              <a:t>sự</a:t>
+              <a:t>là</a:t>
             </a:r>
             <a:r>
               <a:rPr lang="en-US" sz="2400" dirty="0" smtClean="0"/>
@@ -39837,7 +39953,7 @@
             </a:r>
             <a:r>
               <a:rPr lang="en-US" sz="2400" dirty="0" err="1" smtClean="0"/>
-              <a:t>phù</a:t>
+              <a:t>một</a:t>
             </a:r>
             <a:r>
               <a:rPr lang="en-US" sz="2400" dirty="0" smtClean="0"/>
@@ -39845,7 +39961,7 @@
             </a:r>
             <a:r>
               <a:rPr lang="en-US" sz="2400" dirty="0" err="1" smtClean="0"/>
-              <a:t>hợp</a:t>
+              <a:t>biến</a:t>
             </a:r>
             <a:r>
               <a:rPr lang="en-US" sz="2400" dirty="0" smtClean="0"/>
@@ -39862,38 +39978,6 @@
             <a:r>
               <a:rPr lang="en-US" sz="2400" dirty="0" err="1" smtClean="0"/>
               <a:t>phân</a:t>
-            </a:r>
-            <a:r>
-              <a:rPr lang="en-US" sz="2400" dirty="0" smtClean="0"/>
-              <a:t>: R</a:t>
-            </a:r>
-            <a:r>
-              <a:rPr lang="en-US" sz="2400" baseline="-25000" dirty="0" smtClean="0"/>
-              <a:t>d, q</a:t>
-            </a:r>
-            <a:r>
-              <a:rPr lang="en-US" sz="2400" dirty="0" smtClean="0"/>
-              <a:t>: </a:t>
-            </a:r>
-            <a:r>
-              <a:rPr lang="en-US" sz="2400" dirty="0" err="1" smtClean="0"/>
-              <a:t>là</a:t>
-            </a:r>
-            <a:r>
-              <a:rPr lang="en-US" sz="2400" dirty="0" smtClean="0"/>
-              <a:t> </a:t>
-            </a:r>
-            <a:r>
-              <a:rPr lang="en-US" sz="2400" dirty="0" err="1" smtClean="0"/>
-              <a:t>một</a:t>
-            </a:r>
-            <a:r>
-              <a:rPr lang="en-US" sz="2400" dirty="0" smtClean="0"/>
-              <a:t> </a:t>
-            </a:r>
-            <a:r>
-              <a:rPr lang="en-US" sz="2400" dirty="0" err="1" smtClean="0"/>
-              <a:t>biến</a:t>
             </a:r>
             <a:r>
               <a:rPr lang="en-US" sz="2400" dirty="0" smtClean="0"/>
@@ -40012,8 +40096,28 @@
               <a:defRPr/>
             </a:pPr>
             <a:r>
+              <a:rPr lang="en-US" sz="2400" dirty="0" smtClean="0"/>
+              <a:t>Theo </a:t>
+            </a:r>
+            <a:r>
               <a:rPr lang="en-US" sz="2400" dirty="0" err="1" smtClean="0"/>
-              <a:t>Xếp</a:t>
+              <a:t>phương</a:t>
+            </a:r>
+            <a:r>
+              <a:rPr lang="en-US" sz="2400" dirty="0" smtClean="0"/>
+              <a:t> </a:t>
+            </a:r>
+            <a:r>
+              <a:rPr lang="en-US" sz="2400" dirty="0" err="1" smtClean="0"/>
+              <a:t>pháp</a:t>
+            </a:r>
+            <a:r>
+              <a:rPr lang="en-US" sz="2400" dirty="0" smtClean="0"/>
+              <a:t> </a:t>
+            </a:r>
+            <a:r>
+              <a:rPr lang="en-US" sz="2400" dirty="0" err="1" smtClean="0"/>
+              <a:t>xếp</a:t>
             </a:r>
             <a:r>
               <a:rPr lang="en-US" sz="2400" dirty="0" smtClean="0"/>
@@ -40029,14 +40133,6 @@
             </a:r>
             <a:r>
               <a:rPr lang="en-US" sz="2400" dirty="0" err="1" smtClean="0"/>
-              <a:t>theo</a:t>
-            </a:r>
-            <a:r>
-              <a:rPr lang="en-US" sz="2400" dirty="0" smtClean="0"/>
-              <a:t> </a:t>
-            </a:r>
-            <a:r>
-              <a:rPr lang="en-US" sz="2400" dirty="0" err="1" smtClean="0"/>
               <a:t>xác</a:t>
             </a:r>
             <a:r>
@@ -40049,27 +40145,11 @@
             </a:r>
             <a:r>
               <a:rPr lang="en-US" sz="2400" dirty="0" smtClean="0"/>
-              <a:t> </a:t>
+              <a:t>, </a:t>
             </a:r>
             <a:r>
               <a:rPr lang="en-US" sz="2400" dirty="0" err="1" smtClean="0"/>
-              <a:t>là</a:t>
-            </a:r>
-            <a:r>
-              <a:rPr lang="en-US" sz="2400" dirty="0" smtClean="0"/>
-              <a:t> </a:t>
-            </a:r>
-            <a:r>
-              <a:rPr lang="en-US" sz="2400" dirty="0" err="1" smtClean="0"/>
-              <a:t>sắp</a:t>
-            </a:r>
-            <a:r>
-              <a:rPr lang="en-US" sz="2400" dirty="0" smtClean="0"/>
-              <a:t> </a:t>
-            </a:r>
-            <a:r>
-              <a:rPr lang="en-US" sz="2400" dirty="0" err="1" smtClean="0"/>
-              <a:t>xếp</a:t>
+              <a:t>các</a:t>
             </a:r>
             <a:r>
               <a:rPr lang="en-US" sz="2400" dirty="0" smtClean="0"/>
@@ -40093,6 +40173,30 @@
             </a:r>
             <a:r>
               <a:rPr lang="en-US" sz="2400" dirty="0" err="1" smtClean="0"/>
+              <a:t>được</a:t>
+            </a:r>
+            <a:r>
+              <a:rPr lang="en-US" sz="2400" dirty="0" smtClean="0"/>
+              <a:t> </a:t>
+            </a:r>
+            <a:r>
+              <a:rPr lang="en-US" sz="2400" dirty="0" err="1" smtClean="0"/>
+              <a:t>trả</a:t>
+            </a:r>
+            <a:r>
+              <a:rPr lang="en-US" sz="2400" dirty="0" smtClean="0"/>
+              <a:t> </a:t>
+            </a:r>
+            <a:r>
+              <a:rPr lang="en-US" sz="2400" dirty="0" err="1" smtClean="0"/>
+              <a:t>về</a:t>
+            </a:r>
+            <a:r>
+              <a:rPr lang="en-US" sz="2400" dirty="0" smtClean="0"/>
+              <a:t> </a:t>
+            </a:r>
+            <a:r>
+              <a:rPr lang="en-US" sz="2400" dirty="0" err="1" smtClean="0"/>
               <a:t>theo</a:t>
             </a:r>
             <a:r>
@@ -40101,7 +40205,7 @@
             </a:r>
             <a:r>
               <a:rPr lang="en-US" sz="2400" dirty="0" err="1" smtClean="0"/>
-              <a:t>trật</a:t>
+              <a:t>thứ</a:t>
             </a:r>
             <a:r>
               <a:rPr lang="en-US" sz="2400" dirty="0" smtClean="0"/>
@@ -40527,7 +40631,7 @@
             </a:r>
             <a:r>
               <a:rPr lang="en-US" sz="2400" dirty="0" err="1" smtClean="0"/>
-              <a:t>trả</a:t>
+              <a:t>tối</a:t>
             </a:r>
             <a:r>
               <a:rPr lang="en-US" sz="2400" dirty="0" smtClean="0"/>
@@ -40535,7 +40639,7 @@
             </a:r>
             <a:r>
               <a:rPr lang="en-US" sz="2400" dirty="0" err="1" smtClean="0"/>
-              <a:t>về</a:t>
+              <a:t>ưu</a:t>
             </a:r>
             <a:r>
               <a:rPr lang="en-US" sz="2400" dirty="0" smtClean="0"/>
@@ -40543,7 +40647,7 @@
             </a:r>
             <a:r>
               <a:rPr lang="en-US" sz="2400" dirty="0" err="1" smtClean="0"/>
-              <a:t>văn</a:t>
+              <a:t>cho</a:t>
             </a:r>
             <a:r>
               <a:rPr lang="en-US" sz="2400" dirty="0" smtClean="0"/>
@@ -40551,7 +40655,7 @@
             </a:r>
             <a:r>
               <a:rPr lang="en-US" sz="2400" dirty="0" err="1" smtClean="0"/>
-              <a:t>bản</a:t>
+              <a:t>danh</a:t>
             </a:r>
             <a:r>
               <a:rPr lang="en-US" sz="2400" dirty="0" smtClean="0"/>
@@ -40559,7 +40663,15 @@
             </a:r>
             <a:r>
               <a:rPr lang="en-US" sz="2400" dirty="0" err="1" smtClean="0"/>
-              <a:t>hiệu</a:t>
+              <a:t>sách</a:t>
+            </a:r>
+            <a:r>
+              <a:rPr lang="en-US" sz="2400" dirty="0" smtClean="0"/>
+              <a:t> </a:t>
+            </a:r>
+            <a:r>
+              <a:rPr lang="en-US" sz="2400" dirty="0" err="1" smtClean="0"/>
+              <a:t>kết</a:t>
             </a:r>
             <a:r>
               <a:rPr lang="en-US" sz="2400" dirty="0" smtClean="0"/>
@@ -40575,12 +40687,21 @@
             </a:r>
             <a:r>
               <a:rPr lang="en-US" sz="2400" dirty="0" err="1" smtClean="0"/>
-              <a:t>nhất</a:t>
+              <a:t>tìm</a:t>
+            </a:r>
+            <a:r>
+              <a:rPr lang="en-US" sz="2400" dirty="0" smtClean="0"/>
+              <a:t> </a:t>
+            </a:r>
+            <a:r>
+              <a:rPr lang="en-US" sz="2400" dirty="0" err="1" smtClean="0"/>
+              <a:t>kiếm</a:t>
             </a:r>
             <a:r>
               <a:rPr lang="en-US" sz="2400" dirty="0" smtClean="0"/>
               <a:t>.</a:t>
             </a:r>
+            <a:endParaRPr lang="en-US" sz="2400" dirty="0" smtClean="0"/>
           </a:p>
           <a:p>
             <a:pPr eaLnBrk="1" hangingPunct="1">
@@ -40829,7 +40950,7 @@
             <a:pPr eaLnBrk="1" hangingPunct="1"/>
             <a:r>
               <a:rPr lang="en-US" sz="3600" dirty="0" err="1" smtClean="0"/>
-              <a:t>Xếp</a:t>
+              <a:t>Trọng</a:t>
             </a:r>
             <a:r>
               <a:rPr lang="en-US" sz="3600" dirty="0" smtClean="0"/>
@@ -40837,7 +40958,7 @@
             </a:r>
             <a:r>
               <a:rPr lang="en-US" sz="3600" dirty="0" err="1" smtClean="0"/>
-              <a:t>hạng</a:t>
+              <a:t>số</a:t>
             </a:r>
             <a:r>
               <a:rPr lang="en-US" sz="3600" dirty="0" smtClean="0"/>
@@ -40845,23 +40966,7 @@
             </a:r>
             <a:r>
               <a:rPr lang="en-US" sz="3600" dirty="0" err="1" smtClean="0"/>
-              <a:t>theo</a:t>
-            </a:r>
-            <a:r>
-              <a:rPr lang="en-US" sz="3600" dirty="0" smtClean="0"/>
-              <a:t> </a:t>
-            </a:r>
-            <a:r>
-              <a:rPr lang="en-US" sz="3600" dirty="0" err="1" smtClean="0"/>
-              <a:t>xác</a:t>
-            </a:r>
-            <a:r>
-              <a:rPr lang="en-US" sz="3600" dirty="0" smtClean="0"/>
-              <a:t> </a:t>
-            </a:r>
-            <a:r>
-              <a:rPr lang="en-US" sz="3600" dirty="0" err="1" smtClean="0"/>
-              <a:t>suất</a:t>
+              <a:t>từ</a:t>
             </a:r>
             <a:endParaRPr lang="vi-VN" sz="3600" dirty="0" smtClean="0"/>
           </a:p>
@@ -40896,8 +41001,48 @@
               <a:t>“</a:t>
             </a:r>
             <a:r>
+              <a:rPr lang="en-US" sz="2800" dirty="0" err="1" smtClean="0"/>
+              <a:t>Từ</a:t>
+            </a:r>
+            <a:r>
+              <a:rPr lang="en-US" sz="2800" dirty="0" smtClean="0"/>
+              <a:t> </a:t>
+            </a:r>
+            <a:r>
+              <a:rPr lang="en-US" sz="2800" dirty="0" err="1" smtClean="0"/>
+              <a:t>xuất</a:t>
+            </a:r>
+            <a:r>
+              <a:rPr lang="en-US" sz="2800" dirty="0" smtClean="0"/>
+              <a:t> </a:t>
+            </a:r>
+            <a:r>
+              <a:rPr lang="en-US" sz="2800" dirty="0" err="1" smtClean="0"/>
+              <a:t>hiện</a:t>
+            </a:r>
+            <a:r>
+              <a:rPr lang="en-US" sz="2800" dirty="0" smtClean="0"/>
+              <a:t> </a:t>
+            </a:r>
+            <a:r>
+              <a:rPr lang="en-US" sz="2800" dirty="0" err="1" smtClean="0"/>
+              <a:t>trong</a:t>
+            </a:r>
+            <a:r>
+              <a:rPr lang="en-US" sz="2800" dirty="0" smtClean="0"/>
+              <a:t> </a:t>
+            </a:r>
+            <a:r>
+              <a:rPr lang="en-US" sz="2800" dirty="0" err="1" smtClean="0"/>
+              <a:t>những</a:t>
+            </a:r>
+            <a:r>
+              <a:rPr lang="en-US" sz="2800" dirty="0" smtClean="0"/>
+              <a:t> </a:t>
+            </a:r>
+            <a:r>
               <a:rPr lang="en-US" sz="2800" dirty="0" err="1"/>
-              <a:t>Với</a:t>
+              <a:t>văn</a:t>
             </a:r>
             <a:r>
               <a:rPr lang="en-US" sz="2800" dirty="0"/>
@@ -40905,31 +41050,7 @@
             </a:r>
             <a:r>
               <a:rPr lang="en-US" sz="2800" dirty="0" err="1"/>
-              <a:t>một</a:t>
-            </a:r>
-            <a:r>
-              <a:rPr lang="en-US" sz="2800" dirty="0"/>
-              <a:t> </a:t>
-            </a:r>
-            <a:r>
-              <a:rPr lang="en-US" sz="2800" dirty="0" err="1"/>
-              <a:t>truy</a:t>
-            </a:r>
-            <a:r>
-              <a:rPr lang="en-US" sz="2800" dirty="0"/>
-              <a:t> </a:t>
-            </a:r>
-            <a:r>
-              <a:rPr lang="en-US" sz="2800" dirty="0" err="1" smtClean="0"/>
-              <a:t>vấn</a:t>
-            </a:r>
-            <a:r>
-              <a:rPr lang="en-US" sz="2800" dirty="0" smtClean="0"/>
-              <a:t>, </a:t>
-            </a:r>
-            <a:r>
-              <a:rPr lang="en-US" sz="2800" dirty="0" err="1"/>
-              <a:t>nếu</a:t>
+              <a:t>bản</a:t>
             </a:r>
             <a:r>
               <a:rPr lang="en-US" sz="2800" dirty="0"/>
@@ -40953,26 +41074,10 @@
             </a:r>
             <a:r>
               <a:rPr lang="en-US" sz="2800" dirty="0" err="1" smtClean="0"/>
-              <a:t>vài</a:t>
+              <a:t>là</a:t>
             </a:r>
             <a:r>
               <a:rPr lang="en-US" sz="2800" dirty="0" smtClean="0"/>
-              <a:t> </a:t>
-            </a:r>
-            <a:r>
-              <a:rPr lang="en-US" sz="2800" dirty="0" err="1"/>
-              <a:t>văn</a:t>
-            </a:r>
-            <a:r>
-              <a:rPr lang="en-US" sz="2800" dirty="0"/>
-              <a:t> </a:t>
-            </a:r>
-            <a:r>
-              <a:rPr lang="en-US" sz="2800" dirty="0" err="1"/>
-              <a:t>bản</a:t>
-            </a:r>
-            <a:r>
-              <a:rPr lang="en-US" sz="2800" dirty="0"/>
               <a:t> </a:t>
             </a:r>
             <a:r>
@@ -40984,24 +41089,16 @@
               <a:t> </a:t>
             </a:r>
             <a:r>
-              <a:rPr lang="en-US" sz="2800" dirty="0" err="1"/>
+              <a:rPr lang="en-US" sz="2800" dirty="0" err="1" smtClean="0"/>
               <a:t>hợp</a:t>
             </a:r>
             <a:r>
-              <a:rPr lang="en-US" sz="2800" dirty="0"/>
-              <a:t>, </a:t>
-            </a:r>
-            <a:r>
-              <a:rPr lang="en-US" sz="2800" dirty="0" err="1"/>
-              <a:t>thì</a:t>
-            </a:r>
-            <a:r>
-              <a:rPr lang="en-US" sz="2800" dirty="0"/>
+              <a:rPr lang="en-US" sz="2800" dirty="0" smtClean="0"/>
               <a:t> </a:t>
             </a:r>
             <a:r>
               <a:rPr lang="en-US" sz="2800" dirty="0" err="1" smtClean="0"/>
-              <a:t>nên</a:t>
+              <a:t>phải</a:t>
             </a:r>
             <a:r>
               <a:rPr lang="en-US" sz="2800" dirty="0" smtClean="0"/>
@@ -41009,7 +41106,7 @@
             </a:r>
             <a:r>
               <a:rPr lang="en-US" sz="2800" dirty="0" err="1" smtClean="0"/>
-              <a:t>tăng</a:t>
+              <a:t>có</a:t>
             </a:r>
             <a:r>
               <a:rPr lang="en-US" sz="2800" dirty="0" smtClean="0"/>
@@ -41033,7 +41130,103 @@
             </a:r>
             <a:r>
               <a:rPr lang="en-US" sz="2800" dirty="0" err="1" smtClean="0"/>
+              <a:t>cao</a:t>
+            </a:r>
+            <a:r>
+              <a:rPr lang="en-US" sz="2800" dirty="0" smtClean="0"/>
+              <a:t> </a:t>
+            </a:r>
+            <a:r>
+              <a:rPr lang="en-US" sz="2800" dirty="0" err="1" smtClean="0"/>
+              <a:t>hơn</a:t>
+            </a:r>
+            <a:r>
+              <a:rPr lang="en-US" sz="2800" dirty="0" smtClean="0"/>
+              <a:t> so </a:t>
+            </a:r>
+            <a:r>
+              <a:rPr lang="en-US" sz="2800" dirty="0" err="1" smtClean="0"/>
+              <a:t>với</a:t>
+            </a:r>
+            <a:r>
+              <a:rPr lang="en-US" sz="2800" dirty="0" smtClean="0"/>
+              <a:t> </a:t>
+            </a:r>
+            <a:r>
+              <a:rPr lang="en-US" sz="2800" dirty="0" err="1" smtClean="0"/>
+              <a:t>trọng</a:t>
+            </a:r>
+            <a:r>
+              <a:rPr lang="en-US" sz="2800" dirty="0" smtClean="0"/>
+              <a:t> </a:t>
+            </a:r>
+            <a:r>
+              <a:rPr lang="en-US" sz="2800" dirty="0" err="1" smtClean="0"/>
+              <a:t>số</a:t>
+            </a:r>
+            <a:r>
+              <a:rPr lang="en-US" sz="2800" dirty="0" smtClean="0"/>
+              <a:t> </a:t>
+            </a:r>
+            <a:r>
+              <a:rPr lang="en-US" sz="2800" dirty="0" err="1" smtClean="0"/>
               <a:t>của</a:t>
+            </a:r>
+            <a:r>
+              <a:rPr lang="en-US" sz="2800" dirty="0" smtClean="0"/>
+              <a:t> </a:t>
+            </a:r>
+            <a:r>
+              <a:rPr lang="en-US" sz="2800" dirty="0" err="1" smtClean="0"/>
+              <a:t>từ</a:t>
+            </a:r>
+            <a:r>
+              <a:rPr lang="en-US" sz="2800" dirty="0" smtClean="0"/>
+              <a:t> </a:t>
+            </a:r>
+            <a:r>
+              <a:rPr lang="en-US" sz="2800" dirty="0" err="1" smtClean="0"/>
+              <a:t>đó</a:t>
+            </a:r>
+            <a:r>
+              <a:rPr lang="en-US" sz="2800" dirty="0" smtClean="0"/>
+              <a:t> </a:t>
+            </a:r>
+            <a:r>
+              <a:rPr lang="en-US" sz="2800" dirty="0" err="1" smtClean="0"/>
+              <a:t>trong</a:t>
+            </a:r>
+            <a:r>
+              <a:rPr lang="en-US" sz="2800" dirty="0" smtClean="0"/>
+              <a:t> </a:t>
+            </a:r>
+            <a:r>
+              <a:rPr lang="en-US" sz="2800" dirty="0" err="1" smtClean="0"/>
+              <a:t>trường</a:t>
+            </a:r>
+            <a:r>
+              <a:rPr lang="en-US" sz="2800" dirty="0" smtClean="0"/>
+              <a:t> </a:t>
+            </a:r>
+            <a:r>
+              <a:rPr lang="en-US" sz="2800" dirty="0" err="1" smtClean="0"/>
+              <a:t>hợp</a:t>
+            </a:r>
+            <a:r>
+              <a:rPr lang="en-US" sz="2800" dirty="0" smtClean="0"/>
+              <a:t> </a:t>
+            </a:r>
+            <a:r>
+              <a:rPr lang="en-US" sz="2800" dirty="0" err="1" smtClean="0"/>
+              <a:t>không</a:t>
+            </a:r>
+            <a:r>
+              <a:rPr lang="en-US" sz="2800" dirty="0" smtClean="0"/>
+              <a:t> </a:t>
+            </a:r>
+            <a:r>
+              <a:rPr lang="en-US" sz="2800" dirty="0" err="1" smtClean="0"/>
+              <a:t>biết</a:t>
             </a:r>
             <a:r>
               <a:rPr lang="en-US" sz="2800" dirty="0" smtClean="0"/>
@@ -41049,94 +41242,6 @@
             </a:r>
             <a:r>
               <a:rPr lang="en-US" sz="2800" dirty="0" err="1" smtClean="0"/>
-              <a:t>từ</a:t>
-            </a:r>
-            <a:r>
-              <a:rPr lang="en-US" sz="2800" dirty="0" smtClean="0"/>
-              <a:t> </a:t>
-            </a:r>
-            <a:r>
-              <a:rPr lang="en-US" sz="2800" dirty="0" err="1" smtClean="0"/>
-              <a:t>xuất</a:t>
-            </a:r>
-            <a:r>
-              <a:rPr lang="en-US" sz="2800" dirty="0" smtClean="0"/>
-              <a:t> </a:t>
-            </a:r>
-            <a:r>
-              <a:rPr lang="en-US" sz="2800" dirty="0" err="1" smtClean="0"/>
-              <a:t>hiện</a:t>
-            </a:r>
-            <a:r>
-              <a:rPr lang="en-US" sz="2800" dirty="0" smtClean="0"/>
-              <a:t> </a:t>
-            </a:r>
-            <a:r>
-              <a:rPr lang="en-US" sz="2800" dirty="0" err="1" smtClean="0"/>
-              <a:t>trong</a:t>
-            </a:r>
-            <a:r>
-              <a:rPr lang="en-US" sz="2800" dirty="0" smtClean="0"/>
-              <a:t> </a:t>
-            </a:r>
-            <a:r>
-              <a:rPr lang="en-US" sz="2800" dirty="0" err="1" smtClean="0"/>
-              <a:t>những</a:t>
-            </a:r>
-            <a:r>
-              <a:rPr lang="en-US" sz="2800" dirty="0" smtClean="0"/>
-              <a:t> </a:t>
-            </a:r>
-            <a:r>
-              <a:rPr lang="en-US" sz="2800" dirty="0" err="1"/>
-              <a:t>văn</a:t>
-            </a:r>
-            <a:r>
-              <a:rPr lang="en-US" sz="2800" dirty="0"/>
-              <a:t> </a:t>
-            </a:r>
-            <a:r>
-              <a:rPr lang="en-US" sz="2800" dirty="0" err="1"/>
-              <a:t>bản</a:t>
-            </a:r>
-            <a:r>
-              <a:rPr lang="en-US" sz="2800" dirty="0"/>
-              <a:t> </a:t>
-            </a:r>
-            <a:r>
-              <a:rPr lang="en-US" sz="2800" dirty="0" err="1"/>
-              <a:t>đó</a:t>
-            </a:r>
-            <a:r>
-              <a:rPr lang="en-US" sz="2800" dirty="0"/>
-              <a:t> </a:t>
-            </a:r>
-            <a:r>
-              <a:rPr lang="en-US" sz="2800" dirty="0" err="1" smtClean="0"/>
-              <a:t>khi</a:t>
-            </a:r>
-            <a:r>
-              <a:rPr lang="en-US" sz="2800" dirty="0" smtClean="0"/>
-              <a:t> </a:t>
-            </a:r>
-            <a:r>
-              <a:rPr lang="en-US" sz="2800" dirty="0" err="1" smtClean="0"/>
-              <a:t>tìm</a:t>
-            </a:r>
-            <a:r>
-              <a:rPr lang="en-US" sz="2800" dirty="0" smtClean="0"/>
-              <a:t> </a:t>
-            </a:r>
-            <a:r>
-              <a:rPr lang="en-US" sz="2800" dirty="0" err="1" smtClean="0"/>
-              <a:t>những</a:t>
-            </a:r>
-            <a:r>
-              <a:rPr lang="en-US" sz="2800" dirty="0" smtClean="0"/>
-              <a:t> </a:t>
-            </a:r>
-            <a:r>
-              <a:rPr lang="en-US" sz="2800" dirty="0" err="1" smtClean="0"/>
               <a:t>văn</a:t>
             </a:r>
             <a:r>
@@ -41169,12 +41274,13 @@
             </a:r>
             <a:r>
               <a:rPr lang="en-US" sz="2800" dirty="0" err="1" smtClean="0"/>
-              <a:t>khác</a:t>
+              <a:t>này</a:t>
             </a:r>
             <a:r>
               <a:rPr lang="en-US" sz="2800" dirty="0" smtClean="0"/>
-              <a:t>.</a:t>
-            </a:r>
+              <a:t>.”</a:t>
+            </a:r>
+            <a:endParaRPr lang="en-US" sz="2800" dirty="0" smtClean="0"/>
           </a:p>
           <a:p>
             <a:pPr marL="0" indent="0" algn="just" eaLnBrk="1" hangingPunct="1">
@@ -41182,6 +41288,10 @@
               <a:defRPr/>
             </a:pPr>
             <a:r>
+              <a:rPr lang="en-US" sz="2800" dirty="0" smtClean="0"/>
+              <a:t>“</a:t>
+            </a:r>
+            <a:r>
               <a:rPr lang="en-US" sz="2800" dirty="0" err="1" smtClean="0"/>
               <a:t>Có</a:t>
             </a:r>
@@ -41339,8 +41449,13 @@
             </a:r>
             <a:r>
               <a:rPr lang="en-US" sz="2800" dirty="0" smtClean="0"/>
-              <a:t> Bayes”</a:t>
-            </a:r>
+              <a:t> </a:t>
+            </a:r>
+            <a:r>
+              <a:rPr lang="en-US" sz="2800" dirty="0" smtClean="0"/>
+              <a:t>Bayes.”</a:t>
+            </a:r>
+            <a:endParaRPr lang="en-US" sz="2800" dirty="0" smtClean="0"/>
           </a:p>
           <a:p>
             <a:pPr marL="0" indent="0" algn="r" eaLnBrk="1" hangingPunct="1">
@@ -41400,7 +41515,7 @@
       </p:sp>
       <p:sp>
         <p:nvSpPr>
-          <p:cNvPr id="5" name="TextBox 4"/>
+          <p:cNvPr id="6" name="TextBox 5"/>
           <p:cNvSpPr txBox="1"/>
           <p:nvPr/>
         </p:nvSpPr>
@@ -41444,22 +41559,6 @@
                 </a:solidFill>
               </a:rPr>
               <a:t>hạng</a:t>
-            </a:r>
-            <a:r>
-              <a:rPr lang="en-US" sz="2400" b="0" dirty="0" smtClean="0">
-                <a:solidFill>
-                  <a:schemeClr val="tx2"/>
-                </a:solidFill>
-              </a:rPr>
-              <a:t> </a:t>
-            </a:r>
-            <a:r>
-              <a:rPr lang="en-US" sz="2400" b="0" dirty="0" err="1" smtClean="0">
-                <a:solidFill>
-                  <a:schemeClr val="tx2"/>
-                </a:solidFill>
-              </a:rPr>
-              <a:t>theo</a:t>
             </a:r>
             <a:r>
               <a:rPr lang="en-US" sz="2400" b="0" dirty="0" smtClean="0">
@@ -41601,7 +41700,7 @@
                   </a:schemeClr>
                 </a:solidFill>
               </a:rPr>
-              <a:t>Phương</a:t>
+              <a:t>Ứng</a:t>
             </a:r>
             <a:r>
               <a:rPr lang="en-US" sz="2800" dirty="0" smtClean="0">
@@ -41621,7 +41720,7 @@
                   </a:schemeClr>
                 </a:solidFill>
               </a:rPr>
-              <a:t>pháp</a:t>
+              <a:t>dụng</a:t>
             </a:r>
             <a:r>
               <a:rPr lang="en-US" sz="2800" dirty="0" smtClean="0">
@@ -41641,7 +41740,7 @@
                   </a:schemeClr>
                 </a:solidFill>
               </a:rPr>
-              <a:t>tìm</a:t>
+              <a:t>lý</a:t>
             </a:r>
             <a:r>
               <a:rPr lang="en-US" sz="2800" dirty="0" smtClean="0">
@@ -41661,7 +41760,7 @@
                   </a:schemeClr>
                 </a:solidFill>
               </a:rPr>
-              <a:t>kiếm</a:t>
+              <a:t>thuyết</a:t>
             </a:r>
             <a:r>
               <a:rPr lang="en-US" sz="2800" dirty="0" smtClean="0">
@@ -41681,7 +41780,7 @@
                   </a:schemeClr>
                 </a:solidFill>
               </a:rPr>
-              <a:t>dựa</a:t>
+              <a:t>xác</a:t>
             </a:r>
             <a:r>
               <a:rPr lang="en-US" sz="2800" dirty="0" smtClean="0">
@@ -41701,7 +41800,7 @@
                   </a:schemeClr>
                 </a:solidFill>
               </a:rPr>
-              <a:t>trên</a:t>
+              <a:t>suất</a:t>
             </a:r>
             <a:r>
               <a:rPr lang="en-US" sz="2800" dirty="0" smtClean="0">
@@ -41721,7 +41820,7 @@
                   </a:schemeClr>
                 </a:solidFill>
               </a:rPr>
-              <a:t>xác</a:t>
+              <a:t>trong</a:t>
             </a:r>
             <a:r>
               <a:rPr lang="en-US" sz="2800" dirty="0" smtClean="0">
@@ -41741,7 +41840,27 @@
                   </a:schemeClr>
                 </a:solidFill>
               </a:rPr>
-              <a:t>suất</a:t>
+              <a:t>tìm</a:t>
+            </a:r>
+            <a:r>
+              <a:rPr lang="en-US" sz="2800" dirty="0" smtClean="0">
+                <a:solidFill>
+                  <a:schemeClr val="bg1">
+                    <a:lumMod val="65000"/>
+                  </a:schemeClr>
+                </a:solidFill>
+              </a:rPr>
+              <a:t> </a:t>
+            </a:r>
+            <a:r>
+              <a:rPr lang="en-US" sz="2800" dirty="0" err="1" smtClean="0">
+                <a:solidFill>
+                  <a:schemeClr val="bg1">
+                    <a:lumMod val="65000"/>
+                  </a:schemeClr>
+                </a:solidFill>
+              </a:rPr>
+              <a:t>kiếm</a:t>
             </a:r>
             <a:endParaRPr lang="en-US" sz="2800" dirty="0" smtClean="0">
               <a:solidFill>
@@ -42475,7 +42594,7 @@
   </a:extraClrSchemeLst>
   <a:extLst>
     <a:ext uri="{05A4C25C-085E-4340-85A3-A5531E510DB2}">
-      <thm15:themeFamily xmlns:thm15="http://schemas.microsoft.com/office/thememl/2012/main" xmlns="" name="Office Theme" id="{62F939B6-93AF-4DB8-9C6B-D6C7DFDC589F}" vid="{4A3C46E8-61CC-4603-A589-7422A47A8E4A}"/>
+      <thm15:themeFamily xmlns="" xmlns:thm15="http://schemas.microsoft.com/office/thememl/2012/main" name="Office Theme" id="{62F939B6-93AF-4DB8-9C6B-D6C7DFDC589F}" vid="{4A3C46E8-61CC-4603-A589-7422A47A8E4A}"/>
     </a:ext>
   </a:extLst>
 </a:theme>
@@ -42524,7 +42643,7 @@
     </a:clrScheme>
     <a:fontScheme name="Office">
       <a:majorFont>
-        <a:latin typeface="Calibri Light" panose="020F0302020204030204"/>
+        <a:latin typeface="Calibri Light"/>
         <a:ea typeface=""/>
         <a:cs typeface=""/>
         <a:font script="Jpan" typeface="ＭＳ Ｐゴシック"/>
@@ -42559,7 +42678,7 @@
         <a:font script="Geor" typeface="Sylfaen"/>
       </a:majorFont>
       <a:minorFont>
-        <a:latin typeface="Calibri" panose="020F0502020204030204"/>
+        <a:latin typeface="Calibri"/>
         <a:ea typeface=""/>
         <a:cs typeface=""/>
         <a:font script="Jpan" typeface="ＭＳ Ｐゴシック"/>
@@ -42736,7 +42855,7 @@
   <a:extraClrSchemeLst/>
   <a:extLst>
     <a:ext uri="{05A4C25C-085E-4340-85A3-A5531E510DB2}">
-      <thm15:themeFamily xmlns:thm15="http://schemas.microsoft.com/office/thememl/2012/main" xmlns="" name="Office Theme" id="{62F939B6-93AF-4DB8-9C6B-D6C7DFDC589F}" vid="{4A3C46E8-61CC-4603-A589-7422A47A8E4A}"/>
+      <thm15:themeFamily xmlns="" xmlns:thm15="http://schemas.microsoft.com/office/thememl/2012/main" name="Office Theme" id="{62F939B6-93AF-4DB8-9C6B-D6C7DFDC589F}" vid="{4A3C46E8-61CC-4603-A589-7422A47A8E4A}"/>
     </a:ext>
   </a:extLst>
 </a:theme>

</xml_diff>